<commit_message>
Linked in videos to into
</commit_message>
<xml_diff>
--- a/Lecture Slides/01 Introduction.pptx
+++ b/Lecture Slides/01 Introduction.pptx
@@ -24,6 +24,9 @@
     <p:sldId id="268" r:id="rId18"/>
     <p:sldId id="260" r:id="rId19"/>
     <p:sldId id="261" r:id="rId20"/>
+    <p:sldId id="276" r:id="rId21"/>
+    <p:sldId id="277" r:id="rId22"/>
+    <p:sldId id="278" r:id="rId23"/>
   </p:sldIdLst>
   <p:sldSz cx="12192000" cy="6858000"/>
   <p:notesSz cx="6858000" cy="9144000"/>
@@ -3899,55 +3902,135 @@
           <a:p>
             <a:r>
               <a:rPr lang="en-GB" dirty="0"/>
-              <a:t>Choose your project preferences</a:t>
-            </a:r>
-          </a:p>
-          <a:p>
-            <a:r>
-              <a:rPr lang="en-GB" dirty="0"/>
-              <a:t>Teams finally allocated</a:t>
-            </a:r>
-          </a:p>
-          <a:p>
-            <a:r>
-              <a:rPr lang="en-GB" dirty="0"/>
-              <a:t>Meet with your client to begin analysis</a:t>
-            </a:r>
-          </a:p>
-          <a:p>
-            <a:r>
-              <a:rPr lang="en-GB" dirty="0"/>
-              <a:t>Submit Requirements &amp; Design documents (Portfolio A)</a:t>
-            </a:r>
-          </a:p>
-          <a:p>
-            <a:r>
-              <a:rPr lang="en-GB" dirty="0"/>
-              <a:t>Deploy “Minimum Viable Product” release</a:t>
-            </a:r>
-          </a:p>
-          <a:p>
-            <a:r>
-              <a:rPr lang="en-GB" dirty="0"/>
-              <a:t>Deploy “Beta Version” release</a:t>
-            </a:r>
-          </a:p>
-          <a:p>
-            <a:r>
-              <a:rPr lang="en-GB" dirty="0"/>
-              <a:t>Deploy “Final Version” release</a:t>
-            </a:r>
-          </a:p>
-          <a:p>
-            <a:r>
-              <a:rPr lang="en-GB" dirty="0"/>
-              <a:t>Submit full portfolio</a:t>
-            </a:r>
-          </a:p>
-          <a:p>
-            <a:r>
-              <a:rPr lang="en-GB" dirty="0"/>
-              <a:t>Viva Presentation &amp; Discussion</a:t>
+              <a:t>Choose your project preferences: 3</a:t>
+            </a:r>
+            <a:r>
+              <a:rPr lang="en-GB" baseline="30000" dirty="0"/>
+              <a:t>rd</a:t>
+            </a:r>
+            <a:r>
+              <a:rPr lang="en-GB" dirty="0"/>
+              <a:t> October (by 13:00)</a:t>
+            </a:r>
+          </a:p>
+          <a:p>
+            <a:r>
+              <a:rPr lang="en-GB" dirty="0"/>
+              <a:t>Teams finally allocated: Ready for 5</a:t>
+            </a:r>
+            <a:r>
+              <a:rPr lang="en-GB" baseline="30000" dirty="0"/>
+              <a:t>th</a:t>
+            </a:r>
+            <a:r>
+              <a:rPr lang="en-GB" dirty="0"/>
+              <a:t> October !</a:t>
+            </a:r>
+          </a:p>
+          <a:p>
+            <a:r>
+              <a:rPr lang="en-GB" dirty="0"/>
+              <a:t>First meeting with client: Week of 8</a:t>
+            </a:r>
+            <a:r>
+              <a:rPr lang="en-GB" baseline="30000" dirty="0"/>
+              <a:t>th</a:t>
+            </a:r>
+            <a:r>
+              <a:rPr lang="en-GB" dirty="0"/>
+              <a:t> October (Most arranged on 10</a:t>
+            </a:r>
+            <a:r>
+              <a:rPr lang="en-GB" baseline="30000" dirty="0"/>
+              <a:t>th</a:t>
+            </a:r>
+            <a:r>
+              <a:rPr lang="en-GB" dirty="0"/>
+              <a:t>) </a:t>
+            </a:r>
+          </a:p>
+          <a:p>
+            <a:r>
+              <a:rPr lang="en-GB" dirty="0"/>
+              <a:t>Initial Requirements &amp; Design documents: 16</a:t>
+            </a:r>
+            <a:r>
+              <a:rPr lang="en-GB" baseline="30000" dirty="0"/>
+              <a:t>th</a:t>
+            </a:r>
+            <a:r>
+              <a:rPr lang="en-GB" dirty="0"/>
+              <a:t> November (13:00)</a:t>
+            </a:r>
+          </a:p>
+          <a:p>
+            <a:r>
+              <a:rPr lang="en-GB" dirty="0"/>
+              <a:t>Deploy “Minimum Viable Product” release: 12</a:t>
+            </a:r>
+            <a:r>
+              <a:rPr lang="en-GB" baseline="30000" dirty="0"/>
+              <a:t>th</a:t>
+            </a:r>
+            <a:r>
+              <a:rPr lang="en-GB" dirty="0"/>
+              <a:t> December (13:00)</a:t>
+            </a:r>
+          </a:p>
+          <a:p>
+            <a:r>
+              <a:rPr lang="en-GB" dirty="0"/>
+              <a:t>Deploy “Beta Version” release: 13</a:t>
+            </a:r>
+            <a:r>
+              <a:rPr lang="en-GB" baseline="30000" dirty="0"/>
+              <a:t>th</a:t>
+            </a:r>
+            <a:r>
+              <a:rPr lang="en-GB" dirty="0"/>
+              <a:t> February (13:00)</a:t>
+            </a:r>
+          </a:p>
+          <a:p>
+            <a:r>
+              <a:rPr lang="en-GB" dirty="0"/>
+              <a:t>Deploy “Final Version” release: 17</a:t>
+            </a:r>
+            <a:r>
+              <a:rPr lang="en-GB" baseline="30000" dirty="0"/>
+              <a:t>th</a:t>
+            </a:r>
+            <a:r>
+              <a:rPr lang="en-GB" dirty="0"/>
+              <a:t> April (13:00)</a:t>
+            </a:r>
+          </a:p>
+          <a:p>
+            <a:r>
+              <a:rPr lang="en-GB" dirty="0"/>
+              <a:t>Submit full portfolio: 17</a:t>
+            </a:r>
+            <a:r>
+              <a:rPr lang="en-GB" baseline="30000" dirty="0"/>
+              <a:t>th</a:t>
+            </a:r>
+            <a:r>
+              <a:rPr lang="en-GB" dirty="0"/>
+              <a:t> April (13:00)</a:t>
+            </a:r>
+          </a:p>
+          <a:p>
+            <a:r>
+              <a:rPr lang="en-GB" dirty="0"/>
+              <a:t>Viva Presentation &amp; Discussion: From 29</a:t>
+            </a:r>
+            <a:r>
+              <a:rPr lang="en-GB" baseline="30000" dirty="0"/>
+              <a:t>th</a:t>
+            </a:r>
+            <a:r>
+              <a:rPr lang="en-GB" dirty="0"/>
+              <a:t> April</a:t>
             </a:r>
           </a:p>
         </p:txBody>
@@ -5278,6 +5361,615 @@
   <p:clrMapOvr>
     <a:masterClrMapping/>
   </p:clrMapOvr>
+</p:sld>
+</file>
+
+<file path=ppt/slides/slide20.xml><?xml version="1.0" encoding="utf-8"?>
+<p:sld xmlns:a="http://schemas.openxmlformats.org/drawingml/2006/main" xmlns:r="http://schemas.openxmlformats.org/officeDocument/2006/relationships" xmlns:p="http://schemas.openxmlformats.org/presentationml/2006/main">
+  <p:cSld>
+    <p:spTree>
+      <p:nvGrpSpPr>
+        <p:cNvPr id="1" name=""/>
+        <p:cNvGrpSpPr/>
+        <p:nvPr/>
+      </p:nvGrpSpPr>
+      <p:grpSpPr>
+        <a:xfrm>
+          <a:off x="0" y="0"/>
+          <a:ext cx="0" cy="0"/>
+          <a:chOff x="0" y="0"/>
+          <a:chExt cx="0" cy="0"/>
+        </a:xfrm>
+      </p:grpSpPr>
+      <p:pic>
+        <p:nvPicPr>
+          <p:cNvPr id="5" name="Quantech">
+            <a:hlinkClick r:id="" action="ppaction://media"/>
+            <a:extLst>
+              <a:ext uri="{FF2B5EF4-FFF2-40B4-BE49-F238E27FC236}">
+                <a16:creationId xmlns:a16="http://schemas.microsoft.com/office/drawing/2014/main" id="{D4F51EAC-33C6-4473-A0C8-AEBF03BD2E80}"/>
+              </a:ext>
+            </a:extLst>
+          </p:cNvPr>
+          <p:cNvPicPr>
+            <a:picLocks noChangeAspect="1"/>
+          </p:cNvPicPr>
+          <p:nvPr>
+            <a:videoFile r:link="rId2"/>
+            <p:extLst>
+              <p:ext uri="{DAA4B4D4-6D71-4841-9C94-3DE7FCFB9230}">
+                <p14:media xmlns:p14="http://schemas.microsoft.com/office/powerpoint/2010/main" r:link="rId1"/>
+              </p:ext>
+            </p:extLst>
+          </p:nvPr>
+        </p:nvPicPr>
+        <p:blipFill>
+          <a:blip r:embed="rId4"/>
+          <a:stretch>
+            <a:fillRect/>
+          </a:stretch>
+        </p:blipFill>
+        <p:spPr>
+          <a:xfrm>
+            <a:off x="0" y="0"/>
+            <a:ext cx="12192000" cy="6858000"/>
+          </a:xfrm>
+          <a:prstGeom prst="rect">
+            <a:avLst/>
+          </a:prstGeom>
+        </p:spPr>
+      </p:pic>
+    </p:spTree>
+    <p:extLst>
+      <p:ext uri="{BB962C8B-B14F-4D97-AF65-F5344CB8AC3E}">
+        <p14:creationId xmlns:p14="http://schemas.microsoft.com/office/powerpoint/2010/main" val="3941806682"/>
+      </p:ext>
+    </p:extLst>
+  </p:cSld>
+  <p:clrMapOvr>
+    <a:masterClrMapping/>
+  </p:clrMapOvr>
+  <p:timing>
+    <p:tnLst>
+      <p:par>
+        <p:cTn id="1" dur="indefinite" restart="never" nodeType="tmRoot">
+          <p:childTnLst>
+            <p:seq concurrent="1" nextAc="seek">
+              <p:cTn id="2" dur="indefinite" nodeType="mainSeq">
+                <p:childTnLst>
+                  <p:par>
+                    <p:cTn id="3" fill="hold">
+                      <p:stCondLst>
+                        <p:cond delay="indefinite"/>
+                      </p:stCondLst>
+                      <p:childTnLst>
+                        <p:par>
+                          <p:cTn id="4" fill="hold">
+                            <p:stCondLst>
+                              <p:cond delay="0"/>
+                            </p:stCondLst>
+                            <p:childTnLst>
+                              <p:par>
+                                <p:cTn id="5" presetID="1" presetClass="mediacall" presetSubtype="0" fill="hold" nodeType="clickEffect">
+                                  <p:stCondLst>
+                                    <p:cond delay="0"/>
+                                  </p:stCondLst>
+                                  <p:childTnLst>
+                                    <p:cmd type="call" cmd="playFrom(0.0)">
+                                      <p:cBhvr>
+                                        <p:cTn id="6" dur="96063" fill="hold"/>
+                                        <p:tgtEl>
+                                          <p:spTgt spid="5"/>
+                                        </p:tgtEl>
+                                      </p:cBhvr>
+                                    </p:cmd>
+                                  </p:childTnLst>
+                                </p:cTn>
+                              </p:par>
+                            </p:childTnLst>
+                          </p:cTn>
+                        </p:par>
+                      </p:childTnLst>
+                    </p:cTn>
+                  </p:par>
+                </p:childTnLst>
+              </p:cTn>
+              <p:prevCondLst>
+                <p:cond evt="onPrev" delay="0">
+                  <p:tgtEl>
+                    <p:sldTgt/>
+                  </p:tgtEl>
+                </p:cond>
+              </p:prevCondLst>
+              <p:nextCondLst>
+                <p:cond evt="onNext" delay="0">
+                  <p:tgtEl>
+                    <p:sldTgt/>
+                  </p:tgtEl>
+                </p:cond>
+              </p:nextCondLst>
+            </p:seq>
+            <p:video>
+              <p:cMediaNode vol="80000">
+                <p:cTn id="7" fill="hold" display="0">
+                  <p:stCondLst>
+                    <p:cond delay="indefinite"/>
+                  </p:stCondLst>
+                </p:cTn>
+                <p:tgtEl>
+                  <p:spTgt spid="5"/>
+                </p:tgtEl>
+              </p:cMediaNode>
+            </p:video>
+            <p:seq concurrent="1" nextAc="seek">
+              <p:cTn id="8" restart="whenNotActive" fill="hold" evtFilter="cancelBubble" nodeType="interactiveSeq">
+                <p:stCondLst>
+                  <p:cond evt="onClick" delay="0">
+                    <p:tgtEl>
+                      <p:spTgt spid="5"/>
+                    </p:tgtEl>
+                  </p:cond>
+                </p:stCondLst>
+                <p:endSync evt="end" delay="0">
+                  <p:rtn val="all"/>
+                </p:endSync>
+                <p:childTnLst>
+                  <p:par>
+                    <p:cTn id="9" fill="hold">
+                      <p:stCondLst>
+                        <p:cond delay="0"/>
+                      </p:stCondLst>
+                      <p:childTnLst>
+                        <p:par>
+                          <p:cTn id="10" fill="hold">
+                            <p:stCondLst>
+                              <p:cond delay="0"/>
+                            </p:stCondLst>
+                            <p:childTnLst>
+                              <p:par>
+                                <p:cTn id="11" presetID="2" presetClass="mediacall" presetSubtype="0" fill="hold" nodeType="clickEffect">
+                                  <p:stCondLst>
+                                    <p:cond delay="0"/>
+                                  </p:stCondLst>
+                                  <p:childTnLst>
+                                    <p:cmd type="call" cmd="togglePause">
+                                      <p:cBhvr>
+                                        <p:cTn id="12" dur="1" fill="hold"/>
+                                        <p:tgtEl>
+                                          <p:spTgt spid="5"/>
+                                        </p:tgtEl>
+                                      </p:cBhvr>
+                                    </p:cmd>
+                                  </p:childTnLst>
+                                </p:cTn>
+                              </p:par>
+                            </p:childTnLst>
+                          </p:cTn>
+                        </p:par>
+                      </p:childTnLst>
+                    </p:cTn>
+                  </p:par>
+                </p:childTnLst>
+              </p:cTn>
+              <p:nextCondLst>
+                <p:cond evt="onClick" delay="0">
+                  <p:tgtEl>
+                    <p:spTgt spid="5"/>
+                  </p:tgtEl>
+                </p:cond>
+              </p:nextCondLst>
+            </p:seq>
+          </p:childTnLst>
+        </p:cTn>
+      </p:par>
+    </p:tnLst>
+  </p:timing>
+</p:sld>
+</file>
+
+<file path=ppt/slides/slide21.xml><?xml version="1.0" encoding="utf-8"?>
+<p:sld xmlns:a="http://schemas.openxmlformats.org/drawingml/2006/main" xmlns:r="http://schemas.openxmlformats.org/officeDocument/2006/relationships" xmlns:p="http://schemas.openxmlformats.org/presentationml/2006/main">
+  <p:cSld>
+    <p:spTree>
+      <p:nvGrpSpPr>
+        <p:cNvPr id="1" name=""/>
+        <p:cNvGrpSpPr/>
+        <p:nvPr/>
+      </p:nvGrpSpPr>
+      <p:grpSpPr>
+        <a:xfrm>
+          <a:off x="0" y="0"/>
+          <a:ext cx="0" cy="0"/>
+          <a:chOff x="0" y="0"/>
+          <a:chExt cx="0" cy="0"/>
+        </a:xfrm>
+      </p:grpSpPr>
+      <p:pic>
+        <p:nvPicPr>
+          <p:cNvPr id="4" name="Bristech">
+            <a:hlinkClick r:id="" action="ppaction://media"/>
+            <a:extLst>
+              <a:ext uri="{FF2B5EF4-FFF2-40B4-BE49-F238E27FC236}">
+                <a16:creationId xmlns:a16="http://schemas.microsoft.com/office/drawing/2014/main" id="{734A4B5F-BD2A-41C5-A4B7-60E8D1842F89}"/>
+              </a:ext>
+            </a:extLst>
+          </p:cNvPr>
+          <p:cNvPicPr>
+            <a:picLocks noChangeAspect="1"/>
+          </p:cNvPicPr>
+          <p:nvPr>
+            <a:videoFile r:link="rId2"/>
+            <p:extLst>
+              <p:ext uri="{DAA4B4D4-6D71-4841-9C94-3DE7FCFB9230}">
+                <p14:media xmlns:p14="http://schemas.microsoft.com/office/powerpoint/2010/main" r:link="rId1"/>
+              </p:ext>
+            </p:extLst>
+          </p:nvPr>
+        </p:nvPicPr>
+        <p:blipFill>
+          <a:blip r:embed="rId4"/>
+          <a:stretch>
+            <a:fillRect/>
+          </a:stretch>
+        </p:blipFill>
+        <p:spPr>
+          <a:xfrm>
+            <a:off x="0" y="0"/>
+            <a:ext cx="12192000" cy="6858000"/>
+          </a:xfrm>
+          <a:prstGeom prst="rect">
+            <a:avLst/>
+          </a:prstGeom>
+        </p:spPr>
+      </p:pic>
+    </p:spTree>
+    <p:extLst>
+      <p:ext uri="{BB962C8B-B14F-4D97-AF65-F5344CB8AC3E}">
+        <p14:creationId xmlns:p14="http://schemas.microsoft.com/office/powerpoint/2010/main" val="2533460521"/>
+      </p:ext>
+    </p:extLst>
+  </p:cSld>
+  <p:clrMapOvr>
+    <a:masterClrMapping/>
+  </p:clrMapOvr>
+  <p:timing>
+    <p:tnLst>
+      <p:par>
+        <p:cTn id="1" dur="indefinite" restart="never" nodeType="tmRoot">
+          <p:childTnLst>
+            <p:seq concurrent="1" nextAc="seek">
+              <p:cTn id="2" dur="indefinite" nodeType="mainSeq">
+                <p:childTnLst>
+                  <p:par>
+                    <p:cTn id="3" fill="hold">
+                      <p:stCondLst>
+                        <p:cond delay="indefinite"/>
+                      </p:stCondLst>
+                      <p:childTnLst>
+                        <p:par>
+                          <p:cTn id="4" fill="hold">
+                            <p:stCondLst>
+                              <p:cond delay="0"/>
+                            </p:stCondLst>
+                            <p:childTnLst>
+                              <p:par>
+                                <p:cTn id="5" presetID="1" presetClass="mediacall" presetSubtype="0" fill="hold" nodeType="clickEffect">
+                                  <p:stCondLst>
+                                    <p:cond delay="0"/>
+                                  </p:stCondLst>
+                                  <p:childTnLst>
+                                    <p:cmd type="call" cmd="playFrom(0.0)">
+                                      <p:cBhvr>
+                                        <p:cTn id="6" dur="95572" fill="hold"/>
+                                        <p:tgtEl>
+                                          <p:spTgt spid="4"/>
+                                        </p:tgtEl>
+                                      </p:cBhvr>
+                                    </p:cmd>
+                                  </p:childTnLst>
+                                </p:cTn>
+                              </p:par>
+                            </p:childTnLst>
+                          </p:cTn>
+                        </p:par>
+                      </p:childTnLst>
+                    </p:cTn>
+                  </p:par>
+                </p:childTnLst>
+              </p:cTn>
+              <p:prevCondLst>
+                <p:cond evt="onPrev" delay="0">
+                  <p:tgtEl>
+                    <p:sldTgt/>
+                  </p:tgtEl>
+                </p:cond>
+              </p:prevCondLst>
+              <p:nextCondLst>
+                <p:cond evt="onNext" delay="0">
+                  <p:tgtEl>
+                    <p:sldTgt/>
+                  </p:tgtEl>
+                </p:cond>
+              </p:nextCondLst>
+            </p:seq>
+            <p:video>
+              <p:cMediaNode vol="80000">
+                <p:cTn id="7" fill="hold" display="0">
+                  <p:stCondLst>
+                    <p:cond delay="indefinite"/>
+                  </p:stCondLst>
+                </p:cTn>
+                <p:tgtEl>
+                  <p:spTgt spid="4"/>
+                </p:tgtEl>
+              </p:cMediaNode>
+            </p:video>
+            <p:seq concurrent="1" nextAc="seek">
+              <p:cTn id="8" restart="whenNotActive" fill="hold" evtFilter="cancelBubble" nodeType="interactiveSeq">
+                <p:stCondLst>
+                  <p:cond evt="onClick" delay="0">
+                    <p:tgtEl>
+                      <p:spTgt spid="4"/>
+                    </p:tgtEl>
+                  </p:cond>
+                </p:stCondLst>
+                <p:endSync evt="end" delay="0">
+                  <p:rtn val="all"/>
+                </p:endSync>
+                <p:childTnLst>
+                  <p:par>
+                    <p:cTn id="9" fill="hold">
+                      <p:stCondLst>
+                        <p:cond delay="0"/>
+                      </p:stCondLst>
+                      <p:childTnLst>
+                        <p:par>
+                          <p:cTn id="10" fill="hold">
+                            <p:stCondLst>
+                              <p:cond delay="0"/>
+                            </p:stCondLst>
+                            <p:childTnLst>
+                              <p:par>
+                                <p:cTn id="11" presetID="2" presetClass="mediacall" presetSubtype="0" fill="hold" nodeType="clickEffect">
+                                  <p:stCondLst>
+                                    <p:cond delay="0"/>
+                                  </p:stCondLst>
+                                  <p:childTnLst>
+                                    <p:cmd type="call" cmd="togglePause">
+                                      <p:cBhvr>
+                                        <p:cTn id="12" dur="1" fill="hold"/>
+                                        <p:tgtEl>
+                                          <p:spTgt spid="4"/>
+                                        </p:tgtEl>
+                                      </p:cBhvr>
+                                    </p:cmd>
+                                  </p:childTnLst>
+                                </p:cTn>
+                              </p:par>
+                            </p:childTnLst>
+                          </p:cTn>
+                        </p:par>
+                      </p:childTnLst>
+                    </p:cTn>
+                  </p:par>
+                </p:childTnLst>
+              </p:cTn>
+              <p:nextCondLst>
+                <p:cond evt="onClick" delay="0">
+                  <p:tgtEl>
+                    <p:spTgt spid="4"/>
+                  </p:tgtEl>
+                </p:cond>
+              </p:nextCondLst>
+            </p:seq>
+          </p:childTnLst>
+        </p:cTn>
+      </p:par>
+    </p:tnLst>
+  </p:timing>
+</p:sld>
+</file>
+
+<file path=ppt/slides/slide22.xml><?xml version="1.0" encoding="utf-8"?>
+<p:sld xmlns:a="http://schemas.openxmlformats.org/drawingml/2006/main" xmlns:r="http://schemas.openxmlformats.org/officeDocument/2006/relationships" xmlns:p="http://schemas.openxmlformats.org/presentationml/2006/main">
+  <p:cSld>
+    <p:spTree>
+      <p:nvGrpSpPr>
+        <p:cNvPr id="1" name=""/>
+        <p:cNvGrpSpPr/>
+        <p:nvPr/>
+      </p:nvGrpSpPr>
+      <p:grpSpPr>
+        <a:xfrm>
+          <a:off x="0" y="0"/>
+          <a:ext cx="0" cy="0"/>
+          <a:chOff x="0" y="0"/>
+          <a:chExt cx="0" cy="0"/>
+        </a:xfrm>
+      </p:grpSpPr>
+      <p:pic>
+        <p:nvPicPr>
+          <p:cNvPr id="4" name="StudyAbroad">
+            <a:hlinkClick r:id="" action="ppaction://media"/>
+            <a:extLst>
+              <a:ext uri="{FF2B5EF4-FFF2-40B4-BE49-F238E27FC236}">
+                <a16:creationId xmlns:a16="http://schemas.microsoft.com/office/drawing/2014/main" id="{6FF60682-1FA1-48F2-8782-64AE8522FEDA}"/>
+              </a:ext>
+            </a:extLst>
+          </p:cNvPr>
+          <p:cNvPicPr>
+            <a:picLocks noChangeAspect="1"/>
+          </p:cNvPicPr>
+          <p:nvPr>
+            <a:videoFile r:link="rId2"/>
+            <p:extLst>
+              <p:ext uri="{DAA4B4D4-6D71-4841-9C94-3DE7FCFB9230}">
+                <p14:media xmlns:p14="http://schemas.microsoft.com/office/powerpoint/2010/main" r:link="rId1"/>
+              </p:ext>
+            </p:extLst>
+          </p:nvPr>
+        </p:nvPicPr>
+        <p:blipFill>
+          <a:blip r:embed="rId4"/>
+          <a:stretch>
+            <a:fillRect/>
+          </a:stretch>
+        </p:blipFill>
+        <p:spPr>
+          <a:xfrm>
+            <a:off x="0" y="0"/>
+            <a:ext cx="12192000" cy="6858000"/>
+          </a:xfrm>
+          <a:prstGeom prst="rect">
+            <a:avLst/>
+          </a:prstGeom>
+        </p:spPr>
+      </p:pic>
+    </p:spTree>
+    <p:extLst>
+      <p:ext uri="{BB962C8B-B14F-4D97-AF65-F5344CB8AC3E}">
+        <p14:creationId xmlns:p14="http://schemas.microsoft.com/office/powerpoint/2010/main" val="3379898883"/>
+      </p:ext>
+    </p:extLst>
+  </p:cSld>
+  <p:clrMapOvr>
+    <a:masterClrMapping/>
+  </p:clrMapOvr>
+  <p:timing>
+    <p:tnLst>
+      <p:par>
+        <p:cTn id="1" dur="indefinite" restart="never" nodeType="tmRoot">
+          <p:childTnLst>
+            <p:seq concurrent="1" nextAc="seek">
+              <p:cTn id="2" dur="indefinite" nodeType="mainSeq">
+                <p:childTnLst>
+                  <p:par>
+                    <p:cTn id="3" fill="hold">
+                      <p:stCondLst>
+                        <p:cond delay="indefinite"/>
+                      </p:stCondLst>
+                      <p:childTnLst>
+                        <p:par>
+                          <p:cTn id="4" fill="hold">
+                            <p:stCondLst>
+                              <p:cond delay="0"/>
+                            </p:stCondLst>
+                            <p:childTnLst>
+                              <p:par>
+                                <p:cTn id="5" presetID="1" presetClass="mediacall" presetSubtype="0" fill="hold" nodeType="clickEffect">
+                                  <p:stCondLst>
+                                    <p:cond delay="0"/>
+                                  </p:stCondLst>
+                                  <p:childTnLst>
+                                    <p:cmd type="call" cmd="playFrom(0.0)">
+                                      <p:cBhvr>
+                                        <p:cTn id="6" dur="52244" fill="hold"/>
+                                        <p:tgtEl>
+                                          <p:spTgt spid="4"/>
+                                        </p:tgtEl>
+                                      </p:cBhvr>
+                                    </p:cmd>
+                                  </p:childTnLst>
+                                </p:cTn>
+                              </p:par>
+                            </p:childTnLst>
+                          </p:cTn>
+                        </p:par>
+                      </p:childTnLst>
+                    </p:cTn>
+                  </p:par>
+                </p:childTnLst>
+              </p:cTn>
+              <p:prevCondLst>
+                <p:cond evt="onPrev" delay="0">
+                  <p:tgtEl>
+                    <p:sldTgt/>
+                  </p:tgtEl>
+                </p:cond>
+              </p:prevCondLst>
+              <p:nextCondLst>
+                <p:cond evt="onNext" delay="0">
+                  <p:tgtEl>
+                    <p:sldTgt/>
+                  </p:tgtEl>
+                </p:cond>
+              </p:nextCondLst>
+            </p:seq>
+            <p:video>
+              <p:cMediaNode vol="80000">
+                <p:cTn id="7" fill="hold" display="0">
+                  <p:stCondLst>
+                    <p:cond delay="indefinite"/>
+                  </p:stCondLst>
+                </p:cTn>
+                <p:tgtEl>
+                  <p:spTgt spid="4"/>
+                </p:tgtEl>
+              </p:cMediaNode>
+            </p:video>
+            <p:seq concurrent="1" nextAc="seek">
+              <p:cTn id="8" restart="whenNotActive" fill="hold" evtFilter="cancelBubble" nodeType="interactiveSeq">
+                <p:stCondLst>
+                  <p:cond evt="onClick" delay="0">
+                    <p:tgtEl>
+                      <p:spTgt spid="4"/>
+                    </p:tgtEl>
+                  </p:cond>
+                </p:stCondLst>
+                <p:endSync evt="end" delay="0">
+                  <p:rtn val="all"/>
+                </p:endSync>
+                <p:childTnLst>
+                  <p:par>
+                    <p:cTn id="9" fill="hold">
+                      <p:stCondLst>
+                        <p:cond delay="0"/>
+                      </p:stCondLst>
+                      <p:childTnLst>
+                        <p:par>
+                          <p:cTn id="10" fill="hold">
+                            <p:stCondLst>
+                              <p:cond delay="0"/>
+                            </p:stCondLst>
+                            <p:childTnLst>
+                              <p:par>
+                                <p:cTn id="11" presetID="2" presetClass="mediacall" presetSubtype="0" fill="hold" nodeType="clickEffect">
+                                  <p:stCondLst>
+                                    <p:cond delay="0"/>
+                                  </p:stCondLst>
+                                  <p:childTnLst>
+                                    <p:cmd type="call" cmd="togglePause">
+                                      <p:cBhvr>
+                                        <p:cTn id="12" dur="1" fill="hold"/>
+                                        <p:tgtEl>
+                                          <p:spTgt spid="4"/>
+                                        </p:tgtEl>
+                                      </p:cBhvr>
+                                    </p:cmd>
+                                  </p:childTnLst>
+                                </p:cTn>
+                              </p:par>
+                            </p:childTnLst>
+                          </p:cTn>
+                        </p:par>
+                      </p:childTnLst>
+                    </p:cTn>
+                  </p:par>
+                </p:childTnLst>
+              </p:cTn>
+              <p:nextCondLst>
+                <p:cond evt="onClick" delay="0">
+                  <p:tgtEl>
+                    <p:spTgt spid="4"/>
+                  </p:tgtEl>
+                </p:cond>
+              </p:nextCondLst>
+            </p:seq>
+          </p:childTnLst>
+        </p:cTn>
+      </p:par>
+    </p:tnLst>
+  </p:timing>
 </p:sld>
 </file>
 

</xml_diff>

<commit_message>
A few last tweaks
</commit_message>
<xml_diff>
--- a/Lecture Slides/01 Introduction.pptx
+++ b/Lecture Slides/01 Introduction.pptx
@@ -13,20 +13,22 @@
     <p:sldId id="257" r:id="rId7"/>
     <p:sldId id="272" r:id="rId8"/>
     <p:sldId id="262" r:id="rId9"/>
-    <p:sldId id="267" r:id="rId10"/>
-    <p:sldId id="273" r:id="rId11"/>
-    <p:sldId id="274" r:id="rId12"/>
-    <p:sldId id="265" r:id="rId13"/>
-    <p:sldId id="275" r:id="rId14"/>
-    <p:sldId id="269" r:id="rId15"/>
-    <p:sldId id="263" r:id="rId16"/>
-    <p:sldId id="270" r:id="rId17"/>
-    <p:sldId id="268" r:id="rId18"/>
-    <p:sldId id="260" r:id="rId19"/>
-    <p:sldId id="261" r:id="rId20"/>
-    <p:sldId id="276" r:id="rId21"/>
-    <p:sldId id="277" r:id="rId22"/>
-    <p:sldId id="278" r:id="rId23"/>
+    <p:sldId id="279" r:id="rId10"/>
+    <p:sldId id="267" r:id="rId11"/>
+    <p:sldId id="273" r:id="rId12"/>
+    <p:sldId id="274" r:id="rId13"/>
+    <p:sldId id="265" r:id="rId14"/>
+    <p:sldId id="275" r:id="rId15"/>
+    <p:sldId id="269" r:id="rId16"/>
+    <p:sldId id="263" r:id="rId17"/>
+    <p:sldId id="270" r:id="rId18"/>
+    <p:sldId id="280" r:id="rId19"/>
+    <p:sldId id="268" r:id="rId20"/>
+    <p:sldId id="260" r:id="rId21"/>
+    <p:sldId id="261" r:id="rId22"/>
+    <p:sldId id="276" r:id="rId23"/>
+    <p:sldId id="277" r:id="rId24"/>
+    <p:sldId id="278" r:id="rId25"/>
   </p:sldIdLst>
   <p:sldSz cx="12192000" cy="6858000"/>
   <p:notesSz cx="6858000" cy="9144000"/>
@@ -1124,8 +1126,8 @@
         </p:nvSpPr>
         <p:spPr>
           <a:xfrm>
-            <a:off x="3195144" y="157657"/>
-            <a:ext cx="8032531" cy="1389993"/>
+            <a:off x="3815256" y="157658"/>
+            <a:ext cx="7412420" cy="1114094"/>
           </a:xfrm>
         </p:spPr>
         <p:txBody>
@@ -1133,10 +1135,10 @@
           <a:lstStyle/>
           <a:p>
             <a:r>
-              <a:rPr lang="en-US"/>
+              <a:rPr lang="en-US" dirty="0"/>
               <a:t>Click to edit Master title style</a:t>
             </a:r>
-            <a:endParaRPr lang="en-GB"/>
+            <a:endParaRPr lang="en-GB" dirty="0"/>
           </a:p>
         </p:txBody>
       </p:sp>
@@ -3662,7 +3664,7 @@
           <p:cNvPr id="2" name="Content Placeholder 1">
             <a:extLst>
               <a:ext uri="{FF2B5EF4-FFF2-40B4-BE49-F238E27FC236}">
-                <a16:creationId xmlns:a16="http://schemas.microsoft.com/office/drawing/2014/main" id="{363A5EB0-ADC6-42E0-8858-F8A93EDA29D3}"/>
+                <a16:creationId xmlns:a16="http://schemas.microsoft.com/office/drawing/2014/main" id="{69EC6982-9691-4E9D-B6B7-B41EE3DD586E}"/>
               </a:ext>
             </a:extLst>
           </p:cNvPr>
@@ -3680,31 +3682,45 @@
           <a:p>
             <a:r>
               <a:rPr lang="en-GB" dirty="0"/>
-              <a:t>GIT or Subversion repositories for code / document sharing</a:t>
-            </a:r>
-          </a:p>
-          <a:p>
-            <a:r>
-              <a:rPr lang="en-GB" dirty="0"/>
-              <a:t>Your favourite editor (might make sense to agree on one for team)</a:t>
-            </a:r>
-          </a:p>
-          <a:p>
-            <a:r>
-              <a:rPr lang="en-GB" dirty="0"/>
-              <a:t>We recommend Maven as a build tool</a:t>
-            </a:r>
-          </a:p>
-          <a:p>
-            <a:r>
-              <a:rPr lang="en-GB" dirty="0"/>
-              <a:t>Open Project for project management support (more next lecture !)</a:t>
-            </a:r>
-          </a:p>
-          <a:p>
-            <a:r>
-              <a:rPr lang="en-GB" dirty="0"/>
-              <a:t>You may like to explore other communication and collaboration tools</a:t>
+              <a:t>We need consistency across the cohort if we hope to provide support</a:t>
+            </a:r>
+          </a:p>
+          <a:p>
+            <a:r>
+              <a:rPr lang="en-GB" dirty="0"/>
+              <a:t>You are free to choose libraries / frameworks as appropriate</a:t>
+            </a:r>
+          </a:p>
+          <a:p>
+            <a:r>
+              <a:rPr lang="en-GB" dirty="0"/>
+              <a:t>But Java must be your main implementation language:</a:t>
+            </a:r>
+          </a:p>
+          <a:p>
+            <a:pPr lvl="1"/>
+            <a:r>
+              <a:rPr lang="en-GB" dirty="0"/>
+              <a:t>Android mobile Apps</a:t>
+            </a:r>
+          </a:p>
+          <a:p>
+            <a:pPr lvl="1"/>
+            <a:r>
+              <a:rPr lang="en-GB" dirty="0"/>
+              <a:t>Java Server-side application framework (Spring Boot !)</a:t>
+            </a:r>
+          </a:p>
+          <a:p>
+            <a:r>
+              <a:rPr lang="en-GB" dirty="0"/>
+              <a:t>Naturally, for web UIs you will have to use HTML/JS/CSS</a:t>
+            </a:r>
+          </a:p>
+          <a:p>
+            <a:r>
+              <a:rPr lang="en-GB" dirty="0"/>
+              <a:t>Discuss with us if any of this is impractical for your client/domain</a:t>
             </a:r>
           </a:p>
         </p:txBody>
@@ -3714,7 +3730,7 @@
           <p:cNvPr id="3" name="Title 2">
             <a:extLst>
               <a:ext uri="{FF2B5EF4-FFF2-40B4-BE49-F238E27FC236}">
-                <a16:creationId xmlns:a16="http://schemas.microsoft.com/office/drawing/2014/main" id="{58D52EBD-48C2-4674-9177-AF232D880F02}"/>
+                <a16:creationId xmlns:a16="http://schemas.microsoft.com/office/drawing/2014/main" id="{78FBBADA-F74F-443E-A39A-7BEF5F0B17BE}"/>
               </a:ext>
             </a:extLst>
           </p:cNvPr>
@@ -3732,7 +3748,7 @@
           <a:p>
             <a:r>
               <a:rPr lang="en-GB" dirty="0"/>
-              <a:t>Development Support Tools</a:t>
+              <a:t>Implementation Technologies</a:t>
             </a:r>
           </a:p>
         </p:txBody>
@@ -3740,7 +3756,7 @@
     </p:spTree>
     <p:extLst>
       <p:ext uri="{BB962C8B-B14F-4D97-AF65-F5344CB8AC3E}">
-        <p14:creationId xmlns:p14="http://schemas.microsoft.com/office/powerpoint/2010/main" val="3049288003"/>
+        <p14:creationId xmlns:p14="http://schemas.microsoft.com/office/powerpoint/2010/main" val="1236912641"/>
       </p:ext>
     </p:extLst>
   </p:cSld>
@@ -3772,7 +3788,7 @@
           <p:cNvPr id="2" name="Content Placeholder 1">
             <a:extLst>
               <a:ext uri="{FF2B5EF4-FFF2-40B4-BE49-F238E27FC236}">
-                <a16:creationId xmlns:a16="http://schemas.microsoft.com/office/drawing/2014/main" id="{640ACE17-E07D-459C-B113-5D7BAF06DE30}"/>
+                <a16:creationId xmlns:a16="http://schemas.microsoft.com/office/drawing/2014/main" id="{363A5EB0-ADC6-42E0-8858-F8A93EDA29D3}"/>
               </a:ext>
             </a:extLst>
           </p:cNvPr>
@@ -3790,31 +3806,31 @@
           <a:p>
             <a:r>
               <a:rPr lang="en-GB" dirty="0"/>
-              <a:t>A Light-touch documentation portfolio</a:t>
-            </a:r>
-          </a:p>
-          <a:p>
-            <a:r>
-              <a:rPr lang="en-GB" dirty="0"/>
-              <a:t>The nature and quality of your development process</a:t>
-            </a:r>
-          </a:p>
-          <a:p>
-            <a:r>
-              <a:rPr lang="en-GB" dirty="0"/>
-              <a:t>Team dynamics and relationship with client</a:t>
-            </a:r>
-          </a:p>
-          <a:p>
-            <a:r>
-              <a:rPr lang="en-GB" dirty="0"/>
-              <a:t>The quality and extent of your finished product</a:t>
-            </a:r>
-          </a:p>
-          <a:p>
-            <a:r>
-              <a:rPr lang="en-GB" dirty="0"/>
-              <a:t>"Viva" style presentation and discussion</a:t>
+              <a:t>GIT or Subversion repositories for code / document sharing</a:t>
+            </a:r>
+          </a:p>
+          <a:p>
+            <a:r>
+              <a:rPr lang="en-GB" dirty="0"/>
+              <a:t>Your favourite editor (might make sense to agree on one for team)</a:t>
+            </a:r>
+          </a:p>
+          <a:p>
+            <a:r>
+              <a:rPr lang="en-GB" dirty="0"/>
+              <a:t>We recommend Maven as a build tool</a:t>
+            </a:r>
+          </a:p>
+          <a:p>
+            <a:r>
+              <a:rPr lang="en-GB" dirty="0"/>
+              <a:t>Open Project for project management support (more next lecture !)</a:t>
+            </a:r>
+          </a:p>
+          <a:p>
+            <a:r>
+              <a:rPr lang="en-GB" dirty="0"/>
+              <a:t>You may like to explore other communication and collaboration tools</a:t>
             </a:r>
           </a:p>
         </p:txBody>
@@ -3824,7 +3840,7 @@
           <p:cNvPr id="3" name="Title 2">
             <a:extLst>
               <a:ext uri="{FF2B5EF4-FFF2-40B4-BE49-F238E27FC236}">
-                <a16:creationId xmlns:a16="http://schemas.microsoft.com/office/drawing/2014/main" id="{7A3F4CEC-8CF0-4AEE-BDDD-6DAD2EBB74D8}"/>
+                <a16:creationId xmlns:a16="http://schemas.microsoft.com/office/drawing/2014/main" id="{58D52EBD-48C2-4674-9177-AF232D880F02}"/>
               </a:ext>
             </a:extLst>
           </p:cNvPr>
@@ -3842,7 +3858,7 @@
           <a:p>
             <a:r>
               <a:rPr lang="en-GB" dirty="0"/>
-              <a:t>Assessment</a:t>
+              <a:t>Development Support Tools</a:t>
             </a:r>
           </a:p>
         </p:txBody>
@@ -3850,7 +3866,7 @@
     </p:spTree>
     <p:extLst>
       <p:ext uri="{BB962C8B-B14F-4D97-AF65-F5344CB8AC3E}">
-        <p14:creationId xmlns:p14="http://schemas.microsoft.com/office/powerpoint/2010/main" val="4134060955"/>
+        <p14:creationId xmlns:p14="http://schemas.microsoft.com/office/powerpoint/2010/main" val="3049288003"/>
       </p:ext>
     </p:extLst>
   </p:cSld>
@@ -3882,7 +3898,7 @@
           <p:cNvPr id="2" name="Content Placeholder 1">
             <a:extLst>
               <a:ext uri="{FF2B5EF4-FFF2-40B4-BE49-F238E27FC236}">
-                <a16:creationId xmlns:a16="http://schemas.microsoft.com/office/drawing/2014/main" id="{D2CE4C16-4CAA-49C0-8C37-55DB228483DC}"/>
+                <a16:creationId xmlns:a16="http://schemas.microsoft.com/office/drawing/2014/main" id="{640ACE17-E07D-459C-B113-5D7BAF06DE30}"/>
               </a:ext>
             </a:extLst>
           </p:cNvPr>
@@ -3891,164 +3907,6 @@
           </p:cNvSpPr>
           <p:nvPr>
             <p:ph idx="1"/>
-          </p:nvPr>
-        </p:nvSpPr>
-        <p:spPr/>
-        <p:txBody>
-          <a:bodyPr>
-            <a:normAutofit lnSpcReduction="10000"/>
-          </a:bodyPr>
-          <a:lstStyle/>
-          <a:p>
-            <a:r>
-              <a:rPr lang="en-GB" dirty="0"/>
-              <a:t>Choose your project preferences: 3</a:t>
-            </a:r>
-            <a:r>
-              <a:rPr lang="en-GB" baseline="30000" dirty="0"/>
-              <a:t>rd</a:t>
-            </a:r>
-            <a:r>
-              <a:rPr lang="en-GB" dirty="0"/>
-              <a:t> October (by 13:00)</a:t>
-            </a:r>
-          </a:p>
-          <a:p>
-            <a:r>
-              <a:rPr lang="en-GB" dirty="0"/>
-              <a:t>Teams finally allocated: Ready for 5</a:t>
-            </a:r>
-            <a:r>
-              <a:rPr lang="en-GB" baseline="30000" dirty="0"/>
-              <a:t>th</a:t>
-            </a:r>
-            <a:r>
-              <a:rPr lang="en-GB" dirty="0"/>
-              <a:t> October !</a:t>
-            </a:r>
-          </a:p>
-          <a:p>
-            <a:r>
-              <a:rPr lang="en-GB" dirty="0"/>
-              <a:t>First meeting with client: Week of 8</a:t>
-            </a:r>
-            <a:r>
-              <a:rPr lang="en-GB" baseline="30000" dirty="0"/>
-              <a:t>th</a:t>
-            </a:r>
-            <a:r>
-              <a:rPr lang="en-GB" dirty="0"/>
-              <a:t> October (Most arranged on 10</a:t>
-            </a:r>
-            <a:r>
-              <a:rPr lang="en-GB" baseline="30000" dirty="0"/>
-              <a:t>th</a:t>
-            </a:r>
-            <a:r>
-              <a:rPr lang="en-GB" dirty="0"/>
-              <a:t>) </a:t>
-            </a:r>
-          </a:p>
-          <a:p>
-            <a:r>
-              <a:rPr lang="en-GB" dirty="0"/>
-              <a:t>Initial Requirements &amp; Design documents: 16</a:t>
-            </a:r>
-            <a:r>
-              <a:rPr lang="en-GB" baseline="30000" dirty="0"/>
-              <a:t>th</a:t>
-            </a:r>
-            <a:r>
-              <a:rPr lang="en-GB" dirty="0"/>
-              <a:t> November (13:00)</a:t>
-            </a:r>
-          </a:p>
-          <a:p>
-            <a:r>
-              <a:rPr lang="en-GB" dirty="0"/>
-              <a:t>Deploy “Minimum Viable Product” release: 12</a:t>
-            </a:r>
-            <a:r>
-              <a:rPr lang="en-GB" baseline="30000" dirty="0"/>
-              <a:t>th</a:t>
-            </a:r>
-            <a:r>
-              <a:rPr lang="en-GB" dirty="0"/>
-              <a:t> December (13:00)</a:t>
-            </a:r>
-          </a:p>
-          <a:p>
-            <a:r>
-              <a:rPr lang="en-GB" dirty="0"/>
-              <a:t>Deploy “Beta Version” release: 13</a:t>
-            </a:r>
-            <a:r>
-              <a:rPr lang="en-GB" baseline="30000" dirty="0"/>
-              <a:t>th</a:t>
-            </a:r>
-            <a:r>
-              <a:rPr lang="en-GB" dirty="0"/>
-              <a:t> February (13:00)</a:t>
-            </a:r>
-          </a:p>
-          <a:p>
-            <a:r>
-              <a:rPr lang="en-GB" dirty="0"/>
-              <a:t>Deploy “Final Version” release: 17</a:t>
-            </a:r>
-            <a:r>
-              <a:rPr lang="en-GB" baseline="30000" dirty="0"/>
-              <a:t>th</a:t>
-            </a:r>
-            <a:r>
-              <a:rPr lang="en-GB" dirty="0"/>
-              <a:t> April (13:00)</a:t>
-            </a:r>
-          </a:p>
-          <a:p>
-            <a:r>
-              <a:rPr lang="en-GB" dirty="0"/>
-              <a:t>Submit full portfolio: 17</a:t>
-            </a:r>
-            <a:r>
-              <a:rPr lang="en-GB" baseline="30000" dirty="0"/>
-              <a:t>th</a:t>
-            </a:r>
-            <a:r>
-              <a:rPr lang="en-GB" dirty="0"/>
-              <a:t> April (13:00)</a:t>
-            </a:r>
-          </a:p>
-          <a:p>
-            <a:r>
-              <a:rPr lang="en-GB" dirty="0"/>
-              <a:t>Viva Presentation &amp; Discussion: From 29</a:t>
-            </a:r>
-            <a:r>
-              <a:rPr lang="en-GB" baseline="30000" dirty="0"/>
-              <a:t>th</a:t>
-            </a:r>
-            <a:r>
-              <a:rPr lang="en-GB" dirty="0"/>
-              <a:t> April</a:t>
-            </a:r>
-          </a:p>
-        </p:txBody>
-      </p:sp>
-      <p:sp>
-        <p:nvSpPr>
-          <p:cNvPr id="3" name="Title 2">
-            <a:extLst>
-              <a:ext uri="{FF2B5EF4-FFF2-40B4-BE49-F238E27FC236}">
-                <a16:creationId xmlns:a16="http://schemas.microsoft.com/office/drawing/2014/main" id="{4C9CEFB7-2157-4C49-A7B5-5B9B0FC4120D}"/>
-              </a:ext>
-            </a:extLst>
-          </p:cNvPr>
-          <p:cNvSpPr>
-            <a:spLocks noGrp="1"/>
-          </p:cNvSpPr>
-          <p:nvPr>
-            <p:ph type="title"/>
           </p:nvPr>
         </p:nvSpPr>
         <p:spPr/>
@@ -4058,7 +3916,65 @@
           <a:p>
             <a:r>
               <a:rPr lang="en-GB" dirty="0"/>
-              <a:t>Milestones</a:t>
+              <a:t>Requirements and Design materials</a:t>
+            </a:r>
+          </a:p>
+          <a:p>
+            <a:r>
+              <a:rPr lang="en-GB" dirty="0"/>
+              <a:t>The nature and quality of your development process</a:t>
+            </a:r>
+          </a:p>
+          <a:p>
+            <a:r>
+              <a:rPr lang="en-GB" dirty="0"/>
+              <a:t>Meeting release deadlines and milestones</a:t>
+            </a:r>
+          </a:p>
+          <a:p>
+            <a:r>
+              <a:rPr lang="en-GB" dirty="0"/>
+              <a:t>Team dynamics and relationship with client</a:t>
+            </a:r>
+          </a:p>
+          <a:p>
+            <a:r>
+              <a:rPr lang="en-GB" dirty="0"/>
+              <a:t>The quality and extent of your finished product</a:t>
+            </a:r>
+          </a:p>
+          <a:p>
+            <a:r>
+              <a:rPr lang="en-GB" dirty="0"/>
+              <a:t>"Viva" style presentation and discussion</a:t>
+            </a:r>
+          </a:p>
+        </p:txBody>
+      </p:sp>
+      <p:sp>
+        <p:nvSpPr>
+          <p:cNvPr id="3" name="Title 2">
+            <a:extLst>
+              <a:ext uri="{FF2B5EF4-FFF2-40B4-BE49-F238E27FC236}">
+                <a16:creationId xmlns:a16="http://schemas.microsoft.com/office/drawing/2014/main" id="{7A3F4CEC-8CF0-4AEE-BDDD-6DAD2EBB74D8}"/>
+              </a:ext>
+            </a:extLst>
+          </p:cNvPr>
+          <p:cNvSpPr>
+            <a:spLocks noGrp="1"/>
+          </p:cNvSpPr>
+          <p:nvPr>
+            <p:ph type="title"/>
+          </p:nvPr>
+        </p:nvSpPr>
+        <p:spPr/>
+        <p:txBody>
+          <a:bodyPr/>
+          <a:lstStyle/>
+          <a:p>
+            <a:r>
+              <a:rPr lang="en-GB" dirty="0"/>
+              <a:t>Assessed Elements</a:t>
             </a:r>
           </a:p>
         </p:txBody>
@@ -4066,7 +3982,7 @@
     </p:spTree>
     <p:extLst>
       <p:ext uri="{BB962C8B-B14F-4D97-AF65-F5344CB8AC3E}">
-        <p14:creationId xmlns:p14="http://schemas.microsoft.com/office/powerpoint/2010/main" val="1348481708"/>
+        <p14:creationId xmlns:p14="http://schemas.microsoft.com/office/powerpoint/2010/main" val="4134060955"/>
       </p:ext>
     </p:extLst>
   </p:cSld>
@@ -4098,7 +4014,7 @@
           <p:cNvPr id="2" name="Content Placeholder 1">
             <a:extLst>
               <a:ext uri="{FF2B5EF4-FFF2-40B4-BE49-F238E27FC236}">
-                <a16:creationId xmlns:a16="http://schemas.microsoft.com/office/drawing/2014/main" id="{37B2E0E4-FCC8-462D-9994-2D92B6E19B26}"/>
+                <a16:creationId xmlns:a16="http://schemas.microsoft.com/office/drawing/2014/main" id="{D2CE4C16-4CAA-49C0-8C37-55DB228483DC}"/>
               </a:ext>
             </a:extLst>
           </p:cNvPr>
@@ -4112,49 +4028,141 @@
         <p:spPr/>
         <p:txBody>
           <a:bodyPr>
-            <a:normAutofit fontScale="92500"/>
+            <a:normAutofit lnSpcReduction="10000"/>
           </a:bodyPr>
           <a:lstStyle/>
           <a:p>
             <a:r>
               <a:rPr lang="en-GB" dirty="0"/>
-              <a:t>This is a team effort - you must work together</a:t>
-            </a:r>
-          </a:p>
-          <a:p>
-            <a:r>
-              <a:rPr lang="en-GB" dirty="0"/>
-              <a:t>Your group mark will be determined by the output of the entire team</a:t>
-            </a:r>
-          </a:p>
-          <a:p>
-            <a:r>
-              <a:rPr lang="en-GB" dirty="0"/>
-              <a:t>Your individual grade will determined by your contribution to the group</a:t>
-            </a:r>
-          </a:p>
-          <a:p>
-            <a:r>
-              <a:rPr lang="en-GB" dirty="0"/>
-              <a:t>An individual cannot out-perform the team envelop and get a better grade</a:t>
-            </a:r>
-          </a:p>
-          <a:p>
-            <a:r>
-              <a:rPr lang="en-GB" dirty="0"/>
-              <a:t>But they can under-perform and get a worse one</a:t>
-            </a:r>
-          </a:p>
-          <a:p>
-            <a:r>
-              <a:rPr lang="en-GB" dirty="0"/>
-              <a:t>Your individual grade will be based on your engagement with the projects</a:t>
-            </a:r>
-          </a:p>
-          <a:p>
-            <a:r>
-              <a:rPr lang="en-GB" dirty="0"/>
-              <a:t>(as assessed by a number of metrics - to be explained in the next lecture)</a:t>
+              <a:t>Choose your project preferences: 3</a:t>
+            </a:r>
+            <a:r>
+              <a:rPr lang="en-GB" baseline="30000" dirty="0"/>
+              <a:t>rd</a:t>
+            </a:r>
+            <a:r>
+              <a:rPr lang="en-GB" dirty="0"/>
+              <a:t> October (by 13:00)</a:t>
+            </a:r>
+          </a:p>
+          <a:p>
+            <a:r>
+              <a:rPr lang="en-GB" dirty="0"/>
+              <a:t>Teams finally allocated: Ready for 5</a:t>
+            </a:r>
+            <a:r>
+              <a:rPr lang="en-GB" baseline="30000" dirty="0"/>
+              <a:t>th</a:t>
+            </a:r>
+            <a:r>
+              <a:rPr lang="en-GB" dirty="0"/>
+              <a:t> October !</a:t>
+            </a:r>
+          </a:p>
+          <a:p>
+            <a:r>
+              <a:rPr lang="en-GB" dirty="0"/>
+              <a:t>First meeting with client: Week of 8</a:t>
+            </a:r>
+            <a:r>
+              <a:rPr lang="en-GB" baseline="30000" dirty="0"/>
+              <a:t>th</a:t>
+            </a:r>
+            <a:r>
+              <a:rPr lang="en-GB" dirty="0"/>
+              <a:t> October (Most arranged on 10</a:t>
+            </a:r>
+            <a:r>
+              <a:rPr lang="en-GB" baseline="30000" dirty="0"/>
+              <a:t>th</a:t>
+            </a:r>
+            <a:r>
+              <a:rPr lang="en-GB" dirty="0"/>
+              <a:t>) </a:t>
+            </a:r>
+          </a:p>
+          <a:p>
+            <a:r>
+              <a:rPr lang="en-GB" dirty="0"/>
+              <a:t>Initial Requirements &amp; Design documents: 16</a:t>
+            </a:r>
+            <a:r>
+              <a:rPr lang="en-GB" baseline="30000" dirty="0"/>
+              <a:t>th</a:t>
+            </a:r>
+            <a:r>
+              <a:rPr lang="en-GB" dirty="0"/>
+              <a:t> November (13:00)</a:t>
+            </a:r>
+          </a:p>
+          <a:p>
+            <a:r>
+              <a:rPr lang="en-GB" dirty="0"/>
+              <a:t>Deploy “Minimum Viable Product” release: 12</a:t>
+            </a:r>
+            <a:r>
+              <a:rPr lang="en-GB" baseline="30000" dirty="0"/>
+              <a:t>th</a:t>
+            </a:r>
+            <a:r>
+              <a:rPr lang="en-GB" dirty="0"/>
+              <a:t> December (13:00)</a:t>
+            </a:r>
+          </a:p>
+          <a:p>
+            <a:r>
+              <a:rPr lang="en-GB" dirty="0"/>
+              <a:t>Deploy “Beta Version” release: 13</a:t>
+            </a:r>
+            <a:r>
+              <a:rPr lang="en-GB" baseline="30000" dirty="0"/>
+              <a:t>th</a:t>
+            </a:r>
+            <a:r>
+              <a:rPr lang="en-GB" dirty="0"/>
+              <a:t> February (13:00)</a:t>
+            </a:r>
+          </a:p>
+          <a:p>
+            <a:r>
+              <a:rPr lang="en-GB" dirty="0"/>
+              <a:t>Deploy “Final Version” release: 17</a:t>
+            </a:r>
+            <a:r>
+              <a:rPr lang="en-GB" baseline="30000" dirty="0"/>
+              <a:t>th</a:t>
+            </a:r>
+            <a:r>
+              <a:rPr lang="en-GB" dirty="0"/>
+              <a:t> April (13:00)</a:t>
+            </a:r>
+          </a:p>
+          <a:p>
+            <a:r>
+              <a:rPr lang="en-GB" dirty="0"/>
+              <a:t>Submit full portfolio: 17</a:t>
+            </a:r>
+            <a:r>
+              <a:rPr lang="en-GB" baseline="30000" dirty="0"/>
+              <a:t>th</a:t>
+            </a:r>
+            <a:r>
+              <a:rPr lang="en-GB" dirty="0"/>
+              <a:t> April (13:00)</a:t>
+            </a:r>
+          </a:p>
+          <a:p>
+            <a:r>
+              <a:rPr lang="en-GB" dirty="0"/>
+              <a:t>Viva Presentation &amp; Discussion: From 29</a:t>
+            </a:r>
+            <a:r>
+              <a:rPr lang="en-GB" baseline="30000" dirty="0"/>
+              <a:t>th</a:t>
+            </a:r>
+            <a:r>
+              <a:rPr lang="en-GB" dirty="0"/>
+              <a:t> April</a:t>
             </a:r>
           </a:p>
         </p:txBody>
@@ -4164,7 +4172,7 @@
           <p:cNvPr id="3" name="Title 2">
             <a:extLst>
               <a:ext uri="{FF2B5EF4-FFF2-40B4-BE49-F238E27FC236}">
-                <a16:creationId xmlns:a16="http://schemas.microsoft.com/office/drawing/2014/main" id="{4208C713-26C7-46F2-AAB2-5899731BE110}"/>
+                <a16:creationId xmlns:a16="http://schemas.microsoft.com/office/drawing/2014/main" id="{4C9CEFB7-2157-4C49-A7B5-5B9B0FC4120D}"/>
               </a:ext>
             </a:extLst>
           </p:cNvPr>
@@ -4182,7 +4190,7 @@
           <a:p>
             <a:r>
               <a:rPr lang="en-GB" dirty="0"/>
-              <a:t>Team Effort</a:t>
+              <a:t>Milestones</a:t>
             </a:r>
           </a:p>
         </p:txBody>
@@ -4190,7 +4198,7 @@
     </p:spTree>
     <p:extLst>
       <p:ext uri="{BB962C8B-B14F-4D97-AF65-F5344CB8AC3E}">
-        <p14:creationId xmlns:p14="http://schemas.microsoft.com/office/powerpoint/2010/main" val="2208009092"/>
+        <p14:creationId xmlns:p14="http://schemas.microsoft.com/office/powerpoint/2010/main" val="1348481708"/>
       </p:ext>
     </p:extLst>
   </p:cSld>
@@ -4217,42 +4225,81 @@
           <a:chExt cx="0" cy="0"/>
         </a:xfrm>
       </p:grpSpPr>
-      <p:pic>
-        <p:nvPicPr>
-          <p:cNvPr id="4" name="Picture 3">
-            <a:extLst>
-              <a:ext uri="{FF2B5EF4-FFF2-40B4-BE49-F238E27FC236}">
-                <a16:creationId xmlns:a16="http://schemas.microsoft.com/office/drawing/2014/main" id="{5425ECF3-A361-4BCC-8BD8-F5CEE65C4ABE}"/>
-              </a:ext>
-            </a:extLst>
-          </p:cNvPr>
-          <p:cNvPicPr>
-            <a:picLocks noChangeAspect="1"/>
-          </p:cNvPicPr>
-          <p:nvPr/>
-        </p:nvPicPr>
-        <p:blipFill>
-          <a:blip r:embed="rId2"/>
-          <a:stretch>
-            <a:fillRect/>
-          </a:stretch>
-        </p:blipFill>
-        <p:spPr>
-          <a:xfrm>
-            <a:off x="1729740" y="1315783"/>
-            <a:ext cx="8609076" cy="4888725"/>
-          </a:xfrm>
-          <a:prstGeom prst="rect">
-            <a:avLst/>
-          </a:prstGeom>
-        </p:spPr>
-      </p:pic>
-      <p:sp>
-        <p:nvSpPr>
-          <p:cNvPr id="5" name="Title 4">
-            <a:extLst>
-              <a:ext uri="{FF2B5EF4-FFF2-40B4-BE49-F238E27FC236}">
-                <a16:creationId xmlns:a16="http://schemas.microsoft.com/office/drawing/2014/main" id="{81FD63B7-4AF2-4CE9-AC52-C42C0DA1B5E6}"/>
+      <p:sp>
+        <p:nvSpPr>
+          <p:cNvPr id="2" name="Content Placeholder 1">
+            <a:extLst>
+              <a:ext uri="{FF2B5EF4-FFF2-40B4-BE49-F238E27FC236}">
+                <a16:creationId xmlns:a16="http://schemas.microsoft.com/office/drawing/2014/main" id="{37B2E0E4-FCC8-462D-9994-2D92B6E19B26}"/>
+              </a:ext>
+            </a:extLst>
+          </p:cNvPr>
+          <p:cNvSpPr>
+            <a:spLocks noGrp="1"/>
+          </p:cNvSpPr>
+          <p:nvPr>
+            <p:ph idx="1"/>
+          </p:nvPr>
+        </p:nvSpPr>
+        <p:spPr/>
+        <p:txBody>
+          <a:bodyPr>
+            <a:normAutofit fontScale="92500"/>
+          </a:bodyPr>
+          <a:lstStyle/>
+          <a:p>
+            <a:r>
+              <a:rPr lang="en-GB" dirty="0"/>
+              <a:t>This is a team effort - you must work together</a:t>
+            </a:r>
+          </a:p>
+          <a:p>
+            <a:r>
+              <a:rPr lang="en-GB" dirty="0"/>
+              <a:t>Your group mark will be determined by the output of the entire team</a:t>
+            </a:r>
+          </a:p>
+          <a:p>
+            <a:r>
+              <a:rPr lang="en-GB" dirty="0"/>
+              <a:t>Your individual grade will determined by your contribution to the group</a:t>
+            </a:r>
+          </a:p>
+          <a:p>
+            <a:r>
+              <a:rPr lang="en-GB" dirty="0"/>
+              <a:t>An individual cannot out-perform the team envelop and get a better grade</a:t>
+            </a:r>
+          </a:p>
+          <a:p>
+            <a:r>
+              <a:rPr lang="en-GB" dirty="0"/>
+              <a:t>But they can under-perform and get a worse one !</a:t>
+            </a:r>
+          </a:p>
+          <a:p>
+            <a:r>
+              <a:rPr lang="en-GB" dirty="0"/>
+              <a:t>Your individual grade will be based on your engagement with the project</a:t>
+            </a:r>
+          </a:p>
+          <a:p>
+            <a:pPr marL="0" indent="0">
+              <a:buNone/>
+            </a:pPr>
+            <a:r>
+              <a:rPr lang="en-GB" dirty="0"/>
+              <a:t>   (as assessed by a number of metrics - to be explained in the next lecture)</a:t>
+            </a:r>
+          </a:p>
+        </p:txBody>
+      </p:sp>
+      <p:sp>
+        <p:nvSpPr>
+          <p:cNvPr id="3" name="Title 2">
+            <a:extLst>
+              <a:ext uri="{FF2B5EF4-FFF2-40B4-BE49-F238E27FC236}">
+                <a16:creationId xmlns:a16="http://schemas.microsoft.com/office/drawing/2014/main" id="{4208C713-26C7-46F2-AAB2-5899731BE110}"/>
               </a:ext>
             </a:extLst>
           </p:cNvPr>
@@ -4270,7 +4317,7 @@
           <a:p>
             <a:r>
               <a:rPr lang="en-GB" dirty="0"/>
-              <a:t>Support from Rich and Beth</a:t>
+              <a:t>Team Effort</a:t>
             </a:r>
           </a:p>
         </p:txBody>
@@ -4278,7 +4325,7 @@
     </p:spTree>
     <p:extLst>
       <p:ext uri="{BB962C8B-B14F-4D97-AF65-F5344CB8AC3E}">
-        <p14:creationId xmlns:p14="http://schemas.microsoft.com/office/powerpoint/2010/main" val="1525261900"/>
+        <p14:creationId xmlns:p14="http://schemas.microsoft.com/office/powerpoint/2010/main" val="2208009092"/>
       </p:ext>
     </p:extLst>
   </p:cSld>
@@ -4305,6 +4352,94 @@
           <a:chExt cx="0" cy="0"/>
         </a:xfrm>
       </p:grpSpPr>
+      <p:pic>
+        <p:nvPicPr>
+          <p:cNvPr id="4" name="Picture 3">
+            <a:extLst>
+              <a:ext uri="{FF2B5EF4-FFF2-40B4-BE49-F238E27FC236}">
+                <a16:creationId xmlns:a16="http://schemas.microsoft.com/office/drawing/2014/main" id="{5425ECF3-A361-4BCC-8BD8-F5CEE65C4ABE}"/>
+              </a:ext>
+            </a:extLst>
+          </p:cNvPr>
+          <p:cNvPicPr>
+            <a:picLocks noChangeAspect="1"/>
+          </p:cNvPicPr>
+          <p:nvPr/>
+        </p:nvPicPr>
+        <p:blipFill>
+          <a:blip r:embed="rId2"/>
+          <a:stretch>
+            <a:fillRect/>
+          </a:stretch>
+        </p:blipFill>
+        <p:spPr>
+          <a:xfrm>
+            <a:off x="1729740" y="1315783"/>
+            <a:ext cx="8609076" cy="4888725"/>
+          </a:xfrm>
+          <a:prstGeom prst="rect">
+            <a:avLst/>
+          </a:prstGeom>
+        </p:spPr>
+      </p:pic>
+      <p:sp>
+        <p:nvSpPr>
+          <p:cNvPr id="5" name="Title 4">
+            <a:extLst>
+              <a:ext uri="{FF2B5EF4-FFF2-40B4-BE49-F238E27FC236}">
+                <a16:creationId xmlns:a16="http://schemas.microsoft.com/office/drawing/2014/main" id="{81FD63B7-4AF2-4CE9-AC52-C42C0DA1B5E6}"/>
+              </a:ext>
+            </a:extLst>
+          </p:cNvPr>
+          <p:cNvSpPr>
+            <a:spLocks noGrp="1"/>
+          </p:cNvSpPr>
+          <p:nvPr>
+            <p:ph type="title"/>
+          </p:nvPr>
+        </p:nvSpPr>
+        <p:spPr/>
+        <p:txBody>
+          <a:bodyPr/>
+          <a:lstStyle/>
+          <a:p>
+            <a:r>
+              <a:rPr lang="en-GB" dirty="0"/>
+              <a:t>Support from Rich and Beth</a:t>
+            </a:r>
+          </a:p>
+        </p:txBody>
+      </p:sp>
+    </p:spTree>
+    <p:extLst>
+      <p:ext uri="{BB962C8B-B14F-4D97-AF65-F5344CB8AC3E}">
+        <p14:creationId xmlns:p14="http://schemas.microsoft.com/office/powerpoint/2010/main" val="1525261900"/>
+      </p:ext>
+    </p:extLst>
+  </p:cSld>
+  <p:clrMapOvr>
+    <a:masterClrMapping/>
+  </p:clrMapOvr>
+</p:sld>
+</file>
+
+<file path=ppt/slides/slide16.xml><?xml version="1.0" encoding="utf-8"?>
+<p:sld xmlns:a="http://schemas.openxmlformats.org/drawingml/2006/main" xmlns:r="http://schemas.openxmlformats.org/officeDocument/2006/relationships" xmlns:p="http://schemas.openxmlformats.org/presentationml/2006/main">
+  <p:cSld>
+    <p:spTree>
+      <p:nvGrpSpPr>
+        <p:cNvPr id="1" name=""/>
+        <p:cNvGrpSpPr/>
+        <p:nvPr/>
+      </p:nvGrpSpPr>
+      <p:grpSpPr>
+        <a:xfrm>
+          <a:off x="0" y="0"/>
+          <a:ext cx="0" cy="0"/>
+          <a:chOff x="0" y="0"/>
+          <a:chExt cx="0" cy="0"/>
+        </a:xfrm>
+      </p:grpSpPr>
       <p:sp>
         <p:nvSpPr>
           <p:cNvPr id="2" name="Content Placeholder 1">
@@ -4456,10 +4591,10 @@
         </p:nvGrpSpPr>
         <p:grpSpPr>
           <a:xfrm>
-            <a:off x="6096000" y="768096"/>
-            <a:ext cx="3881165" cy="3154710"/>
+            <a:off x="6096000" y="1152380"/>
+            <a:ext cx="3741097" cy="2400657"/>
             <a:chOff x="6096000" y="768096"/>
-            <a:chExt cx="3881165" cy="3154710"/>
+            <a:chExt cx="3741097" cy="2400657"/>
           </a:xfrm>
         </p:grpSpPr>
         <p:sp>
@@ -4477,7 +4612,7 @@
           <p:spPr>
             <a:xfrm>
               <a:off x="6096000" y="768096"/>
-              <a:ext cx="804672" cy="3154710"/>
+              <a:ext cx="804672" cy="2400657"/>
             </a:xfrm>
             <a:prstGeom prst="rect">
               <a:avLst/>
@@ -4491,14 +4626,11 @@
             <a:lstStyle/>
             <a:p>
               <a:r>
-                <a:rPr lang="en-GB" sz="19900" dirty="0">
+                <a:rPr lang="en-GB" sz="15000" b="1" dirty="0">
                   <a:latin typeface="Abadi Extra Light" panose="020B0204020104020204" pitchFamily="34" charset="0"/>
                 </a:rPr>
                 <a:t>}</a:t>
               </a:r>
-              <a:endParaRPr lang="en-GB" dirty="0">
-                <a:latin typeface="Abadi Extra Light" panose="020B0204020104020204" pitchFamily="34" charset="0"/>
-              </a:endParaRPr>
             </a:p>
           </p:txBody>
         </p:sp>
@@ -4516,7 +4648,7 @@
           </p:nvSpPr>
           <p:spPr>
             <a:xfrm>
-              <a:off x="6998208" y="2357643"/>
+              <a:off x="6858140" y="1906800"/>
               <a:ext cx="2978957" cy="523220"/>
             </a:xfrm>
             <a:prstGeom prst="rect">
@@ -4552,10 +4684,10 @@
         </p:nvGrpSpPr>
         <p:grpSpPr>
           <a:xfrm>
-            <a:off x="6096000" y="3017520"/>
-            <a:ext cx="3247746" cy="3154710"/>
+            <a:off x="6042835" y="2566744"/>
+            <a:ext cx="5304835" cy="3508653"/>
             <a:chOff x="6096000" y="3017520"/>
-            <a:chExt cx="3247746" cy="3154710"/>
+            <a:chExt cx="5304835" cy="3508653"/>
           </a:xfrm>
         </p:grpSpPr>
         <p:sp>
@@ -4573,7 +4705,7 @@
           <p:spPr>
             <a:xfrm>
               <a:off x="6096000" y="3017520"/>
-              <a:ext cx="804672" cy="3154710"/>
+              <a:ext cx="804672" cy="3508653"/>
             </a:xfrm>
             <a:prstGeom prst="rect">
               <a:avLst/>
@@ -4587,14 +4719,11 @@
             <a:lstStyle/>
             <a:p>
               <a:r>
-                <a:rPr lang="en-GB" sz="19900" dirty="0">
+                <a:rPr lang="en-GB" sz="22200" dirty="0">
                   <a:latin typeface="Abadi Extra Light" panose="020B0204020104020204" pitchFamily="34" charset="0"/>
                 </a:rPr>
                 <a:t>}</a:t>
               </a:r>
-              <a:endParaRPr lang="en-GB" dirty="0">
-                <a:latin typeface="Abadi Extra Light" panose="020B0204020104020204" pitchFamily="34" charset="0"/>
-              </a:endParaRPr>
             </a:p>
           </p:txBody>
         </p:sp>
@@ -4612,8 +4741,8 @@
           </p:nvSpPr>
           <p:spPr>
             <a:xfrm>
-              <a:off x="7026701" y="4594875"/>
-              <a:ext cx="2317045" cy="523220"/>
+              <a:off x="7037333" y="4827088"/>
+              <a:ext cx="4363502" cy="523220"/>
             </a:xfrm>
             <a:prstGeom prst="rect">
               <a:avLst/>
@@ -4628,7 +4757,7 @@
             <a:p>
               <a:r>
                 <a:rPr lang="en-GB" sz="2800" dirty="0"/>
-                <a:t>Technical Skills</a:t>
+                <a:t>Technical Development Skills</a:t>
               </a:r>
             </a:p>
           </p:txBody>
@@ -4767,183 +4896,6 @@
 </p:sld>
 </file>
 
-<file path=ppt/slides/slide16.xml><?xml version="1.0" encoding="utf-8"?>
-<p:sld xmlns:a="http://schemas.openxmlformats.org/drawingml/2006/main" xmlns:r="http://schemas.openxmlformats.org/officeDocument/2006/relationships" xmlns:p="http://schemas.openxmlformats.org/presentationml/2006/main">
-  <p:cSld>
-    <p:spTree>
-      <p:nvGrpSpPr>
-        <p:cNvPr id="1" name=""/>
-        <p:cNvGrpSpPr/>
-        <p:nvPr/>
-      </p:nvGrpSpPr>
-      <p:grpSpPr>
-        <a:xfrm>
-          <a:off x="0" y="0"/>
-          <a:ext cx="0" cy="0"/>
-          <a:chOff x="0" y="0"/>
-          <a:chExt cx="0" cy="0"/>
-        </a:xfrm>
-      </p:grpSpPr>
-      <p:sp>
-        <p:nvSpPr>
-          <p:cNvPr id="3" name="Title 2">
-            <a:extLst>
-              <a:ext uri="{FF2B5EF4-FFF2-40B4-BE49-F238E27FC236}">
-                <a16:creationId xmlns:a16="http://schemas.microsoft.com/office/drawing/2014/main" id="{2EA71BCE-C39C-47CF-AF61-37171264295E}"/>
-              </a:ext>
-            </a:extLst>
-          </p:cNvPr>
-          <p:cNvSpPr>
-            <a:spLocks noGrp="1"/>
-          </p:cNvSpPr>
-          <p:nvPr>
-            <p:ph type="title"/>
-          </p:nvPr>
-        </p:nvSpPr>
-        <p:spPr>
-          <a:xfrm>
-            <a:off x="208105" y="1754809"/>
-            <a:ext cx="2839896" cy="4365575"/>
-          </a:xfrm>
-        </p:spPr>
-        <p:txBody>
-          <a:bodyPr>
-            <a:normAutofit/>
-          </a:bodyPr>
-          <a:lstStyle/>
-          <a:p>
-            <a:r>
-              <a:rPr lang="en-GB" sz="4000" dirty="0"/>
-              <a:t>Lecture</a:t>
-            </a:r>
-            <a:br>
-              <a:rPr lang="en-GB" sz="4000" dirty="0"/>
-            </a:br>
-            <a:r>
-              <a:rPr lang="en-GB" sz="4000" dirty="0"/>
-              <a:t>materials</a:t>
-            </a:r>
-            <a:br>
-              <a:rPr lang="en-GB" sz="4000" dirty="0"/>
-            </a:br>
-            <a:r>
-              <a:rPr lang="en-GB" sz="4000" dirty="0"/>
-              <a:t>available</a:t>
-            </a:r>
-            <a:br>
-              <a:rPr lang="en-GB" sz="4000" dirty="0"/>
-            </a:br>
-            <a:r>
-              <a:rPr lang="en-GB" sz="4000" dirty="0"/>
-              <a:t>“through”</a:t>
-            </a:r>
-            <a:br>
-              <a:rPr lang="en-GB" sz="4000" dirty="0"/>
-            </a:br>
-            <a:r>
-              <a:rPr lang="en-GB" sz="4000" dirty="0"/>
-              <a:t>Blackboard</a:t>
-            </a:r>
-          </a:p>
-        </p:txBody>
-      </p:sp>
-      <p:pic>
-        <p:nvPicPr>
-          <p:cNvPr id="4" name="Picture 3">
-            <a:extLst>
-              <a:ext uri="{FF2B5EF4-FFF2-40B4-BE49-F238E27FC236}">
-                <a16:creationId xmlns:a16="http://schemas.microsoft.com/office/drawing/2014/main" id="{0C3BE0A9-2382-4ABB-83AA-CC0D65CBDF78}"/>
-              </a:ext>
-            </a:extLst>
-          </p:cNvPr>
-          <p:cNvPicPr>
-            <a:picLocks noChangeAspect="1"/>
-          </p:cNvPicPr>
-          <p:nvPr/>
-        </p:nvPicPr>
-        <p:blipFill rotWithShape="1">
-          <a:blip r:embed="rId2"/>
-          <a:srcRect r="12027"/>
-          <a:stretch/>
-        </p:blipFill>
-        <p:spPr>
-          <a:xfrm>
-            <a:off x="3184915" y="0"/>
-            <a:ext cx="9007085" cy="6858000"/>
-          </a:xfrm>
-          <a:prstGeom prst="rect">
-            <a:avLst/>
-          </a:prstGeom>
-        </p:spPr>
-      </p:pic>
-      <p:sp>
-        <p:nvSpPr>
-          <p:cNvPr id="5" name="Rectangle 4">
-            <a:hlinkClick r:id="rId3"/>
-            <a:extLst>
-              <a:ext uri="{FF2B5EF4-FFF2-40B4-BE49-F238E27FC236}">
-                <a16:creationId xmlns:a16="http://schemas.microsoft.com/office/drawing/2014/main" id="{B6653899-B82B-41BE-8A5A-5FD1A74C7073}"/>
-              </a:ext>
-            </a:extLst>
-          </p:cNvPr>
-          <p:cNvSpPr/>
-          <p:nvPr/>
-        </p:nvSpPr>
-        <p:spPr>
-          <a:xfrm>
-            <a:off x="7997952" y="5705856"/>
-            <a:ext cx="2426208" cy="414528"/>
-          </a:xfrm>
-          <a:prstGeom prst="rect">
-            <a:avLst/>
-          </a:prstGeom>
-          <a:solidFill>
-            <a:srgbClr val="4472C4">
-              <a:alpha val="0"/>
-            </a:srgbClr>
-          </a:solidFill>
-          <a:ln>
-            <a:noFill/>
-          </a:ln>
-        </p:spPr>
-        <p:style>
-          <a:lnRef idx="2">
-            <a:schemeClr val="accent1">
-              <a:shade val="50000"/>
-            </a:schemeClr>
-          </a:lnRef>
-          <a:fillRef idx="1">
-            <a:schemeClr val="accent1"/>
-          </a:fillRef>
-          <a:effectRef idx="0">
-            <a:schemeClr val="accent1"/>
-          </a:effectRef>
-          <a:fontRef idx="minor">
-            <a:schemeClr val="lt1"/>
-          </a:fontRef>
-        </p:style>
-        <p:txBody>
-          <a:bodyPr rtlCol="0" anchor="ctr"/>
-          <a:lstStyle/>
-          <a:p>
-            <a:pPr algn="ctr"/>
-            <a:endParaRPr lang="en-GB"/>
-          </a:p>
-        </p:txBody>
-      </p:sp>
-    </p:spTree>
-    <p:extLst>
-      <p:ext uri="{BB962C8B-B14F-4D97-AF65-F5344CB8AC3E}">
-        <p14:creationId xmlns:p14="http://schemas.microsoft.com/office/powerpoint/2010/main" val="2674010026"/>
-      </p:ext>
-    </p:extLst>
-  </p:cSld>
-  <p:clrMapOvr>
-    <a:masterClrMapping/>
-  </p:clrMapOvr>
-</p:sld>
-</file>
-
 <file path=ppt/slides/slide17.xml><?xml version="1.0" encoding="utf-8"?>
 <p:sld xmlns:a="http://schemas.openxmlformats.org/drawingml/2006/main" xmlns:r="http://schemas.openxmlformats.org/officeDocument/2006/relationships" xmlns:p="http://schemas.openxmlformats.org/presentationml/2006/main">
   <p:cSld>
@@ -4961,96 +4913,39 @@
           <a:chExt cx="0" cy="0"/>
         </a:xfrm>
       </p:grpSpPr>
-      <p:sp>
-        <p:nvSpPr>
-          <p:cNvPr id="2" name="Content Placeholder 1">
-            <a:extLst>
-              <a:ext uri="{FF2B5EF4-FFF2-40B4-BE49-F238E27FC236}">
-                <a16:creationId xmlns:a16="http://schemas.microsoft.com/office/drawing/2014/main" id="{C11F535D-087A-486A-93BB-563F93F7258A}"/>
-              </a:ext>
-            </a:extLst>
-          </p:cNvPr>
-          <p:cNvSpPr>
-            <a:spLocks noGrp="1"/>
-          </p:cNvSpPr>
-          <p:nvPr>
-            <p:ph idx="1"/>
-          </p:nvPr>
-        </p:nvSpPr>
-        <p:spPr/>
-        <p:txBody>
-          <a:bodyPr/>
-          <a:lstStyle/>
-          <a:p>
-            <a:r>
-              <a:rPr lang="en-GB" dirty="0"/>
-              <a:t>2 Lectures per week</a:t>
-            </a:r>
-          </a:p>
-          <a:p>
-            <a:r>
-              <a:rPr lang="en-GB" dirty="0"/>
-              <a:t>Weekly practical session exercises</a:t>
-            </a:r>
-          </a:p>
-          <a:p>
-            <a:r>
-              <a:rPr lang="en-GB" dirty="0"/>
-              <a:t>Meetings with mentors</a:t>
-            </a:r>
-          </a:p>
-          <a:p>
-            <a:r>
-              <a:rPr lang="en-GB" dirty="0"/>
-              <a:t>Meetings with clients</a:t>
-            </a:r>
-          </a:p>
-          <a:p>
-            <a:r>
-              <a:rPr lang="en-GB" dirty="0"/>
-              <a:t>Co-located working as a team</a:t>
-            </a:r>
-          </a:p>
-          <a:p>
-            <a:r>
-              <a:rPr lang="en-GB" dirty="0"/>
-              <a:t>"Reserved" Wednesday mornings</a:t>
-            </a:r>
-          </a:p>
-        </p:txBody>
-      </p:sp>
-      <p:sp>
-        <p:nvSpPr>
-          <p:cNvPr id="3" name="Title 2">
-            <a:extLst>
-              <a:ext uri="{FF2B5EF4-FFF2-40B4-BE49-F238E27FC236}">
-                <a16:creationId xmlns:a16="http://schemas.microsoft.com/office/drawing/2014/main" id="{D39F7EB9-531F-4C71-B630-32B1C221F69F}"/>
-              </a:ext>
-            </a:extLst>
-          </p:cNvPr>
-          <p:cNvSpPr>
-            <a:spLocks noGrp="1"/>
-          </p:cNvSpPr>
-          <p:nvPr>
-            <p:ph type="title"/>
-          </p:nvPr>
-        </p:nvSpPr>
-        <p:spPr/>
-        <p:txBody>
-          <a:bodyPr/>
-          <a:lstStyle/>
-          <a:p>
-            <a:r>
-              <a:rPr lang="en-GB" dirty="0"/>
-              <a:t>Timetable</a:t>
-            </a:r>
-          </a:p>
-        </p:txBody>
-      </p:sp>
+      <p:pic>
+        <p:nvPicPr>
+          <p:cNvPr id="4" name="Picture 3">
+            <a:extLst>
+              <a:ext uri="{FF2B5EF4-FFF2-40B4-BE49-F238E27FC236}">
+                <a16:creationId xmlns:a16="http://schemas.microsoft.com/office/drawing/2014/main" id="{0C3BE0A9-2382-4ABB-83AA-CC0D65CBDF78}"/>
+              </a:ext>
+            </a:extLst>
+          </p:cNvPr>
+          <p:cNvPicPr>
+            <a:picLocks noChangeAspect="1"/>
+          </p:cNvPicPr>
+          <p:nvPr/>
+        </p:nvPicPr>
+        <p:blipFill rotWithShape="1">
+          <a:blip r:embed="rId2"/>
+          <a:srcRect l="-1" t="3084" r="219" b="6554"/>
+          <a:stretch/>
+        </p:blipFill>
+        <p:spPr>
+          <a:xfrm>
+            <a:off x="-1" y="0"/>
+            <a:ext cx="12192001" cy="6849496"/>
+          </a:xfrm>
+          <a:prstGeom prst="rect">
+            <a:avLst/>
+          </a:prstGeom>
+        </p:spPr>
+      </p:pic>
     </p:spTree>
     <p:extLst>
       <p:ext uri="{BB962C8B-B14F-4D97-AF65-F5344CB8AC3E}">
-        <p14:creationId xmlns:p14="http://schemas.microsoft.com/office/powerpoint/2010/main" val="494913501"/>
+        <p14:creationId xmlns:p14="http://schemas.microsoft.com/office/powerpoint/2010/main" val="2674010026"/>
       </p:ext>
     </p:extLst>
   </p:cSld>
@@ -5077,38 +4972,40 @@
           <a:chExt cx="0" cy="0"/>
         </a:xfrm>
       </p:grpSpPr>
-      <p:sp>
-        <p:nvSpPr>
-          <p:cNvPr id="4" name="Title 3">
-            <a:extLst>
-              <a:ext uri="{FF2B5EF4-FFF2-40B4-BE49-F238E27FC236}">
-                <a16:creationId xmlns:a16="http://schemas.microsoft.com/office/drawing/2014/main" id="{7B95D5F8-21AC-4DF9-89FB-2D0D2753C63E}"/>
-              </a:ext>
-            </a:extLst>
-          </p:cNvPr>
-          <p:cNvSpPr>
-            <a:spLocks noGrp="1"/>
-          </p:cNvSpPr>
-          <p:nvPr>
-            <p:ph type="ctrTitle"/>
-          </p:nvPr>
-        </p:nvSpPr>
-        <p:spPr/>
-        <p:txBody>
-          <a:bodyPr/>
-          <a:lstStyle/>
-          <a:p>
-            <a:r>
-              <a:rPr lang="en-GB" dirty="0"/>
-              <a:t>Questions ?</a:t>
-            </a:r>
-          </a:p>
-        </p:txBody>
-      </p:sp>
+      <p:pic>
+        <p:nvPicPr>
+          <p:cNvPr id="5" name="Picture 4">
+            <a:extLst>
+              <a:ext uri="{FF2B5EF4-FFF2-40B4-BE49-F238E27FC236}">
+                <a16:creationId xmlns:a16="http://schemas.microsoft.com/office/drawing/2014/main" id="{EDE9771B-7833-4047-A807-884F8A144190}"/>
+              </a:ext>
+            </a:extLst>
+          </p:cNvPr>
+          <p:cNvPicPr>
+            <a:picLocks noChangeAspect="1"/>
+          </p:cNvPicPr>
+          <p:nvPr/>
+        </p:nvPicPr>
+        <p:blipFill>
+          <a:blip r:embed="rId2"/>
+          <a:stretch>
+            <a:fillRect/>
+          </a:stretch>
+        </p:blipFill>
+        <p:spPr>
+          <a:xfrm>
+            <a:off x="43856" y="97019"/>
+            <a:ext cx="12105611" cy="6656140"/>
+          </a:xfrm>
+          <a:prstGeom prst="rect">
+            <a:avLst/>
+          </a:prstGeom>
+        </p:spPr>
+      </p:pic>
     </p:spTree>
     <p:extLst>
       <p:ext uri="{BB962C8B-B14F-4D97-AF65-F5344CB8AC3E}">
-        <p14:creationId xmlns:p14="http://schemas.microsoft.com/office/powerpoint/2010/main" val="4251460527"/>
+        <p14:creationId xmlns:p14="http://schemas.microsoft.com/office/powerpoint/2010/main" val="25315772"/>
       </p:ext>
     </p:extLst>
   </p:cSld>
@@ -5137,18 +5034,18 @@
       </p:grpSpPr>
       <p:sp>
         <p:nvSpPr>
-          <p:cNvPr id="4" name="Title 3">
-            <a:extLst>
-              <a:ext uri="{FF2B5EF4-FFF2-40B4-BE49-F238E27FC236}">
-                <a16:creationId xmlns:a16="http://schemas.microsoft.com/office/drawing/2014/main" id="{7B95D5F8-21AC-4DF9-89FB-2D0D2753C63E}"/>
-              </a:ext>
-            </a:extLst>
-          </p:cNvPr>
-          <p:cNvSpPr>
-            <a:spLocks noGrp="1"/>
-          </p:cNvSpPr>
-          <p:nvPr>
-            <p:ph type="ctrTitle"/>
+          <p:cNvPr id="2" name="Content Placeholder 1">
+            <a:extLst>
+              <a:ext uri="{FF2B5EF4-FFF2-40B4-BE49-F238E27FC236}">
+                <a16:creationId xmlns:a16="http://schemas.microsoft.com/office/drawing/2014/main" id="{C11F535D-087A-486A-93BB-563F93F7258A}"/>
+              </a:ext>
+            </a:extLst>
+          </p:cNvPr>
+          <p:cNvSpPr>
+            <a:spLocks noGrp="1"/>
+          </p:cNvSpPr>
+          <p:nvPr>
+            <p:ph idx="1"/>
           </p:nvPr>
         </p:nvSpPr>
         <p:spPr/>
@@ -5158,7 +5055,65 @@
           <a:p>
             <a:r>
               <a:rPr lang="en-GB" dirty="0"/>
-              <a:t>Let’s see some examples…</a:t>
+              <a:t>2 Lectures per week</a:t>
+            </a:r>
+          </a:p>
+          <a:p>
+            <a:r>
+              <a:rPr lang="en-GB" dirty="0"/>
+              <a:t>Weekly practical session exercises</a:t>
+            </a:r>
+          </a:p>
+          <a:p>
+            <a:r>
+              <a:rPr lang="en-GB" dirty="0"/>
+              <a:t>Meetings with mentors</a:t>
+            </a:r>
+          </a:p>
+          <a:p>
+            <a:r>
+              <a:rPr lang="en-GB" dirty="0"/>
+              <a:t>Meetings with clients</a:t>
+            </a:r>
+          </a:p>
+          <a:p>
+            <a:r>
+              <a:rPr lang="en-GB" dirty="0"/>
+              <a:t>Co-located working as a team</a:t>
+            </a:r>
+          </a:p>
+          <a:p>
+            <a:r>
+              <a:rPr lang="en-GB" dirty="0"/>
+              <a:t>"Reserved" Wednesday mornings</a:t>
+            </a:r>
+          </a:p>
+        </p:txBody>
+      </p:sp>
+      <p:sp>
+        <p:nvSpPr>
+          <p:cNvPr id="3" name="Title 2">
+            <a:extLst>
+              <a:ext uri="{FF2B5EF4-FFF2-40B4-BE49-F238E27FC236}">
+                <a16:creationId xmlns:a16="http://schemas.microsoft.com/office/drawing/2014/main" id="{D39F7EB9-531F-4C71-B630-32B1C221F69F}"/>
+              </a:ext>
+            </a:extLst>
+          </p:cNvPr>
+          <p:cNvSpPr>
+            <a:spLocks noGrp="1"/>
+          </p:cNvSpPr>
+          <p:nvPr>
+            <p:ph type="title"/>
+          </p:nvPr>
+        </p:nvSpPr>
+        <p:spPr/>
+        <p:txBody>
+          <a:bodyPr/>
+          <a:lstStyle/>
+          <a:p>
+            <a:r>
+              <a:rPr lang="en-GB" dirty="0"/>
+              <a:t>Timetable</a:t>
             </a:r>
           </a:p>
         </p:txBody>
@@ -5166,7 +5121,7 @@
     </p:spTree>
     <p:extLst>
       <p:ext uri="{BB962C8B-B14F-4D97-AF65-F5344CB8AC3E}">
-        <p14:creationId xmlns:p14="http://schemas.microsoft.com/office/powerpoint/2010/main" val="1938976340"/>
+        <p14:creationId xmlns:p14="http://schemas.microsoft.com/office/powerpoint/2010/main" val="494913501"/>
       </p:ext>
     </p:extLst>
   </p:cSld>
@@ -5270,7 +5225,7 @@
             </a:r>
             <a:r>
               <a:rPr lang="en-GB" b="1" i="1" dirty="0"/>
-              <a:t>real business problems</a:t>
+              <a:t>real business needs</a:t>
             </a:r>
             <a:r>
               <a:rPr lang="en-GB" dirty="0"/>
@@ -5346,7 +5301,7 @@
           <a:p>
             <a:r>
               <a:rPr lang="en-GB" dirty="0"/>
-              <a:t>Key learning outcomes of this unit</a:t>
+              <a:t>Key learning outcome</a:t>
             </a:r>
           </a:p>
         </p:txBody>
@@ -5365,6 +5320,122 @@
 </file>
 
 <file path=ppt/slides/slide20.xml><?xml version="1.0" encoding="utf-8"?>
+<p:sld xmlns:a="http://schemas.openxmlformats.org/drawingml/2006/main" xmlns:r="http://schemas.openxmlformats.org/officeDocument/2006/relationships" xmlns:p="http://schemas.openxmlformats.org/presentationml/2006/main">
+  <p:cSld>
+    <p:spTree>
+      <p:nvGrpSpPr>
+        <p:cNvPr id="1" name=""/>
+        <p:cNvGrpSpPr/>
+        <p:nvPr/>
+      </p:nvGrpSpPr>
+      <p:grpSpPr>
+        <a:xfrm>
+          <a:off x="0" y="0"/>
+          <a:ext cx="0" cy="0"/>
+          <a:chOff x="0" y="0"/>
+          <a:chExt cx="0" cy="0"/>
+        </a:xfrm>
+      </p:grpSpPr>
+      <p:sp>
+        <p:nvSpPr>
+          <p:cNvPr id="4" name="Title 3">
+            <a:extLst>
+              <a:ext uri="{FF2B5EF4-FFF2-40B4-BE49-F238E27FC236}">
+                <a16:creationId xmlns:a16="http://schemas.microsoft.com/office/drawing/2014/main" id="{7B95D5F8-21AC-4DF9-89FB-2D0D2753C63E}"/>
+              </a:ext>
+            </a:extLst>
+          </p:cNvPr>
+          <p:cNvSpPr>
+            <a:spLocks noGrp="1"/>
+          </p:cNvSpPr>
+          <p:nvPr>
+            <p:ph type="ctrTitle"/>
+          </p:nvPr>
+        </p:nvSpPr>
+        <p:spPr/>
+        <p:txBody>
+          <a:bodyPr/>
+          <a:lstStyle/>
+          <a:p>
+            <a:r>
+              <a:rPr lang="en-GB" dirty="0"/>
+              <a:t>Questions ?</a:t>
+            </a:r>
+          </a:p>
+        </p:txBody>
+      </p:sp>
+    </p:spTree>
+    <p:extLst>
+      <p:ext uri="{BB962C8B-B14F-4D97-AF65-F5344CB8AC3E}">
+        <p14:creationId xmlns:p14="http://schemas.microsoft.com/office/powerpoint/2010/main" val="4251460527"/>
+      </p:ext>
+    </p:extLst>
+  </p:cSld>
+  <p:clrMapOvr>
+    <a:masterClrMapping/>
+  </p:clrMapOvr>
+</p:sld>
+</file>
+
+<file path=ppt/slides/slide21.xml><?xml version="1.0" encoding="utf-8"?>
+<p:sld xmlns:a="http://schemas.openxmlformats.org/drawingml/2006/main" xmlns:r="http://schemas.openxmlformats.org/officeDocument/2006/relationships" xmlns:p="http://schemas.openxmlformats.org/presentationml/2006/main">
+  <p:cSld>
+    <p:spTree>
+      <p:nvGrpSpPr>
+        <p:cNvPr id="1" name=""/>
+        <p:cNvGrpSpPr/>
+        <p:nvPr/>
+      </p:nvGrpSpPr>
+      <p:grpSpPr>
+        <a:xfrm>
+          <a:off x="0" y="0"/>
+          <a:ext cx="0" cy="0"/>
+          <a:chOff x="0" y="0"/>
+          <a:chExt cx="0" cy="0"/>
+        </a:xfrm>
+      </p:grpSpPr>
+      <p:sp>
+        <p:nvSpPr>
+          <p:cNvPr id="4" name="Title 3">
+            <a:extLst>
+              <a:ext uri="{FF2B5EF4-FFF2-40B4-BE49-F238E27FC236}">
+                <a16:creationId xmlns:a16="http://schemas.microsoft.com/office/drawing/2014/main" id="{7B95D5F8-21AC-4DF9-89FB-2D0D2753C63E}"/>
+              </a:ext>
+            </a:extLst>
+          </p:cNvPr>
+          <p:cNvSpPr>
+            <a:spLocks noGrp="1"/>
+          </p:cNvSpPr>
+          <p:nvPr>
+            <p:ph type="ctrTitle"/>
+          </p:nvPr>
+        </p:nvSpPr>
+        <p:spPr/>
+        <p:txBody>
+          <a:bodyPr/>
+          <a:lstStyle/>
+          <a:p>
+            <a:r>
+              <a:rPr lang="en-GB" dirty="0"/>
+              <a:t>Let’s see some examples…</a:t>
+            </a:r>
+          </a:p>
+        </p:txBody>
+      </p:sp>
+    </p:spTree>
+    <p:extLst>
+      <p:ext uri="{BB962C8B-B14F-4D97-AF65-F5344CB8AC3E}">
+        <p14:creationId xmlns:p14="http://schemas.microsoft.com/office/powerpoint/2010/main" val="1938976340"/>
+      </p:ext>
+    </p:extLst>
+  </p:cSld>
+  <p:clrMapOvr>
+    <a:masterClrMapping/>
+  </p:clrMapOvr>
+</p:sld>
+</file>
+
+<file path=ppt/slides/slide22.xml><?xml version="1.0" encoding="utf-8"?>
 <p:sld xmlns:a="http://schemas.openxmlformats.org/drawingml/2006/main" xmlns:r="http://schemas.openxmlformats.org/officeDocument/2006/relationships" xmlns:p="http://schemas.openxmlformats.org/presentationml/2006/main">
   <p:cSld>
     <p:spTree>
@@ -5567,7 +5638,7 @@
 </p:sld>
 </file>
 
-<file path=ppt/slides/slide21.xml><?xml version="1.0" encoding="utf-8"?>
+<file path=ppt/slides/slide23.xml><?xml version="1.0" encoding="utf-8"?>
 <p:sld xmlns:a="http://schemas.openxmlformats.org/drawingml/2006/main" xmlns:r="http://schemas.openxmlformats.org/officeDocument/2006/relationships" xmlns:p="http://schemas.openxmlformats.org/presentationml/2006/main">
   <p:cSld>
     <p:spTree>
@@ -5770,7 +5841,7 @@
 </p:sld>
 </file>
 
-<file path=ppt/slides/slide22.xml><?xml version="1.0" encoding="utf-8"?>
+<file path=ppt/slides/slide24.xml><?xml version="1.0" encoding="utf-8"?>
 <p:sld xmlns:a="http://schemas.openxmlformats.org/drawingml/2006/main" xmlns:r="http://schemas.openxmlformats.org/officeDocument/2006/relationships" xmlns:p="http://schemas.openxmlformats.org/presentationml/2006/main">
   <p:cSld>
     <p:spTree>
@@ -6006,25 +6077,33 @@
             <p:ph idx="1"/>
           </p:nvPr>
         </p:nvSpPr>
-        <p:spPr/>
+        <p:spPr>
+          <a:xfrm>
+            <a:off x="838200" y="1825625"/>
+            <a:ext cx="10515600" cy="4351338"/>
+          </a:xfrm>
+        </p:spPr>
         <p:txBody>
           <a:bodyPr>
             <a:normAutofit/>
           </a:bodyPr>
           <a:lstStyle/>
           <a:p>
-            <a:r>
-              <a:rPr lang="en-GB" dirty="0"/>
-              <a:t>This is NOT just another programming unit</a:t>
-            </a:r>
-          </a:p>
-          <a:p>
             <a:pPr marL="0" indent="0">
               <a:buNone/>
             </a:pPr>
             <a:r>
               <a:rPr lang="en-GB" dirty="0"/>
-              <a:t>   (Where you get a text description and just need to code it up)</a:t>
+              <a:t>This is NOT just another programming unit</a:t>
+            </a:r>
+          </a:p>
+          <a:p>
+            <a:pPr marL="0" indent="0">
+              <a:buNone/>
+            </a:pPr>
+            <a:r>
+              <a:rPr lang="en-GB" dirty="0"/>
+              <a:t>(Where you get a text description and just need to “code it up”)</a:t>
             </a:r>
           </a:p>
           <a:p>
@@ -6034,32 +6113,42 @@
             <a:endParaRPr lang="en-GB" dirty="0"/>
           </a:p>
           <a:p>
-            <a:r>
-              <a:rPr lang="en-GB" dirty="0"/>
-              <a:t>This is disciplined systems engineering</a:t>
-            </a:r>
-          </a:p>
-          <a:p>
-            <a:r>
-              <a:rPr lang="en-GB" dirty="0"/>
-              <a:t>It is not a "death or glory" </a:t>
-            </a:r>
-            <a:r>
-              <a:rPr lang="en-GB" dirty="0" err="1"/>
-              <a:t>hackfest</a:t>
-            </a:r>
-            <a:endParaRPr lang="en-GB" dirty="0"/>
-          </a:p>
-          <a:p>
-            <a:endParaRPr lang="en-GB" dirty="0"/>
-          </a:p>
-          <a:p>
+            <a:pPr marL="0" indent="0">
+              <a:buNone/>
+            </a:pPr>
+            <a:r>
+              <a:rPr lang="en-GB" dirty="0"/>
+              <a:t>It’s not going to be neat and tidy</a:t>
+            </a:r>
+          </a:p>
+          <a:p>
+            <a:pPr marL="0" indent="0">
+              <a:buNone/>
+            </a:pPr>
+            <a:r>
+              <a:rPr lang="en-GB" dirty="0"/>
+              <a:t>It’s not going to be straight-forward</a:t>
+            </a:r>
+          </a:p>
+          <a:p>
+            <a:pPr marL="0" indent="0">
+              <a:buNone/>
+            </a:pPr>
+            <a:endParaRPr lang="en-GB" sz="2000" dirty="0"/>
+          </a:p>
+          <a:p>
+            <a:pPr marL="0" indent="0">
+              <a:buNone/>
+            </a:pPr>
             <a:r>
               <a:rPr lang="en-GB" dirty="0"/>
               <a:t>No lone maverick hackers heroically conjuring up mysterious code</a:t>
             </a:r>
           </a:p>
           <a:p>
+            <a:pPr marL="0" indent="0">
+              <a:buNone/>
+            </a:pPr>
             <a:r>
               <a:rPr lang="en-GB" dirty="0"/>
               <a:t>This is managed and repeatable </a:t>
@@ -7023,7 +7112,7 @@
           <a:p>
             <a:r>
               <a:rPr lang="en-GB" dirty="0"/>
-              <a:t>Working as a Team</a:t>
+              <a:t>Working as an integrated team</a:t>
             </a:r>
           </a:p>
           <a:p>
@@ -7122,19 +7211,19 @@
           <a:p>
             <a:r>
               <a:rPr lang="en-GB" dirty="0"/>
-              <a:t>Think of Dan and Simon as CEOs of a large development company</a:t>
-            </a:r>
-          </a:p>
-          <a:p>
-            <a:r>
-              <a:rPr lang="en-GB" dirty="0"/>
-              <a:t>Managing over 30 projects</a:t>
-            </a:r>
-          </a:p>
-          <a:p>
-            <a:r>
-              <a:rPr lang="en-GB" dirty="0"/>
-              <a:t>We have drafted in mentors as middle management</a:t>
+              <a:t>Think of us as CEOs of a large development company</a:t>
+            </a:r>
+          </a:p>
+          <a:p>
+            <a:r>
+              <a:rPr lang="en-GB" dirty="0"/>
+              <a:t>We are managing over 30 projects</a:t>
+            </a:r>
+          </a:p>
+          <a:p>
+            <a:r>
+              <a:rPr lang="en-GB" dirty="0"/>
+              <a:t>We’ve drafted in mentors as “middle management”</a:t>
             </a:r>
           </a:p>
           <a:p>
@@ -7152,7 +7241,7 @@
           <a:p>
             <a:r>
               <a:rPr lang="en-GB" dirty="0"/>
-              <a:t>They will push out information</a:t>
+              <a:t>They will push out information to teams</a:t>
             </a:r>
           </a:p>
           <a:p>
@@ -7256,51 +7345,25 @@
           <a:p>
             <a:r>
               <a:rPr lang="en-GB" dirty="0"/>
-              <a:t>We have found the best way is to let students cluster around projects</a:t>
-            </a:r>
-          </a:p>
-          <a:p>
-            <a:r>
-              <a:rPr lang="en-GB" dirty="0"/>
-              <a:t>In the practical session (next) we will release the projects</a:t>
-            </a:r>
-          </a:p>
-          <a:p>
-            <a:r>
-              <a:rPr lang="en-GB" dirty="0"/>
-              <a:t>Using our custom SPE content management system !!!</a:t>
+              <a:t>We’ve found the best way is to let students cluster around projects</a:t>
+            </a:r>
+          </a:p>
+          <a:p>
+            <a:r>
+              <a:rPr lang="en-GB" dirty="0"/>
+              <a:t>In the practical session (next) we’ll release the project descriptions</a:t>
+            </a:r>
+          </a:p>
+          <a:p>
+            <a:r>
+              <a:rPr lang="en-GB" dirty="0"/>
+              <a:t>Using our custom-built SPE content management system !!!</a:t>
             </a:r>
           </a:p>
           <a:p>
             <a:r>
               <a:rPr lang="en-GB" dirty="0"/>
               <a:t>You may browse them and indicate your preferences</a:t>
-            </a:r>
-          </a:p>
-          <a:p>
-            <a:r>
-              <a:rPr lang="en-GB" dirty="0"/>
-              <a:t>In true spirt of Com Sci we’ll use an algorithm to determine best fit</a:t>
-            </a:r>
-          </a:p>
-          <a:p>
-            <a:r>
-              <a:rPr lang="en-GB" dirty="0"/>
-              <a:t>Pareto optimality - for the greater good !</a:t>
-            </a:r>
-          </a:p>
-          <a:p>
-            <a:r>
-              <a:rPr lang="en-GB" dirty="0"/>
-              <a:t>No guaranteed allocation (</a:t>
-            </a:r>
-            <a:r>
-              <a:rPr lang="en-GB" dirty="0" err="1"/>
-              <a:t>soz</a:t>
-            </a:r>
-            <a:r>
-              <a:rPr lang="en-GB" dirty="0"/>
-              <a:t> !)</a:t>
             </a:r>
           </a:p>
         </p:txBody>
@@ -7328,7 +7391,7 @@
           <a:p>
             <a:r>
               <a:rPr lang="en-GB" dirty="0"/>
-              <a:t>Forming Teams</a:t>
+              <a:t>Choosing Projects</a:t>
             </a:r>
           </a:p>
         </p:txBody>
@@ -7368,7 +7431,7 @@
           <p:cNvPr id="2" name="Content Placeholder 1">
             <a:extLst>
               <a:ext uri="{FF2B5EF4-FFF2-40B4-BE49-F238E27FC236}">
-                <a16:creationId xmlns:a16="http://schemas.microsoft.com/office/drawing/2014/main" id="{69EC6982-9691-4E9D-B6B7-B41EE3DD586E}"/>
+                <a16:creationId xmlns:a16="http://schemas.microsoft.com/office/drawing/2014/main" id="{DCB370D6-6F6D-48FD-9CAB-4A9DC0DAFB83}"/>
               </a:ext>
             </a:extLst>
           </p:cNvPr>
@@ -7386,45 +7449,33 @@
           <a:p>
             <a:r>
               <a:rPr lang="en-GB" dirty="0"/>
-              <a:t>We need consistency across the cohort if we hope to provide support</a:t>
-            </a:r>
-          </a:p>
-          <a:p>
-            <a:r>
-              <a:rPr lang="en-GB" dirty="0"/>
-              <a:t>You are free to choose libraries / frameworks as appropriate</a:t>
-            </a:r>
-          </a:p>
-          <a:p>
-            <a:r>
-              <a:rPr lang="en-GB" dirty="0"/>
-              <a:t>But Java must be your main implementation language:</a:t>
-            </a:r>
-          </a:p>
-          <a:p>
-            <a:pPr lvl="1"/>
-            <a:r>
-              <a:rPr lang="en-GB" dirty="0"/>
-              <a:t>Android mobile Apps</a:t>
-            </a:r>
-          </a:p>
-          <a:p>
-            <a:pPr lvl="1"/>
-            <a:r>
-              <a:rPr lang="en-GB" dirty="0"/>
-              <a:t>Java Server-side application framework (Spring Boot !)</a:t>
-            </a:r>
-          </a:p>
-          <a:p>
-            <a:r>
-              <a:rPr lang="en-GB" dirty="0"/>
-              <a:t>Naturally, for web UIs you will have to use HTML/JS/CSS</a:t>
-            </a:r>
-          </a:p>
-          <a:p>
-            <a:r>
-              <a:rPr lang="en-GB" dirty="0"/>
-              <a:t>Discuss with us if any of this is impractical for your client/domain</a:t>
+              <a:t>In true spirt of Computer Science…</a:t>
+            </a:r>
+          </a:p>
+          <a:p>
+            <a:r>
+              <a:rPr lang="en-GB" dirty="0"/>
+              <a:t>We’ll be using an algorithm to determine best fit</a:t>
+            </a:r>
+          </a:p>
+          <a:p>
+            <a:r>
+              <a:rPr lang="en-GB" dirty="0"/>
+              <a:t>Pareto optimality - for the greater good !</a:t>
+            </a:r>
+          </a:p>
+          <a:p>
+            <a:r>
+              <a:rPr lang="en-GB" dirty="0"/>
+              <a:t>No guaranteed allocation (</a:t>
+            </a:r>
+            <a:r>
+              <a:rPr lang="en-GB" dirty="0" err="1"/>
+              <a:t>soz</a:t>
+            </a:r>
+            <a:r>
+              <a:rPr lang="en-GB" dirty="0"/>
+              <a:t> !)</a:t>
             </a:r>
           </a:p>
         </p:txBody>
@@ -7434,7 +7485,7 @@
           <p:cNvPr id="3" name="Title 2">
             <a:extLst>
               <a:ext uri="{FF2B5EF4-FFF2-40B4-BE49-F238E27FC236}">
-                <a16:creationId xmlns:a16="http://schemas.microsoft.com/office/drawing/2014/main" id="{78FBBADA-F74F-443E-A39A-7BEF5F0B17BE}"/>
+                <a16:creationId xmlns:a16="http://schemas.microsoft.com/office/drawing/2014/main" id="{810CDB1E-A1BE-4BB7-A1EE-FB4F70772B12}"/>
               </a:ext>
             </a:extLst>
           </p:cNvPr>
@@ -7452,7 +7503,7 @@
           <a:p>
             <a:r>
               <a:rPr lang="en-GB" dirty="0"/>
-              <a:t>Implementation Technologies</a:t>
+              <a:t>Forming Teams</a:t>
             </a:r>
           </a:p>
         </p:txBody>
@@ -7460,7 +7511,7 @@
     </p:spTree>
     <p:extLst>
       <p:ext uri="{BB962C8B-B14F-4D97-AF65-F5344CB8AC3E}">
-        <p14:creationId xmlns:p14="http://schemas.microsoft.com/office/powerpoint/2010/main" val="1236912641"/>
+        <p14:creationId xmlns:p14="http://schemas.microsoft.com/office/powerpoint/2010/main" val="2703551529"/>
       </p:ext>
     </p:extLst>
   </p:cSld>

</xml_diff>